<commit_message>
updated presentation file from slack
</commit_message>
<xml_diff>
--- a/demo/Anomaly Detection.pptx
+++ b/demo/Anomaly Detection.pptx
@@ -10,8 +10,13 @@
     <p:sldId id="261" r:id="rId4"/>
     <p:sldId id="260" r:id="rId5"/>
     <p:sldId id="262" r:id="rId6"/>
-    <p:sldId id="263" r:id="rId7"/>
-    <p:sldId id="264" r:id="rId8"/>
+    <p:sldId id="269" r:id="rId7"/>
+    <p:sldId id="263" r:id="rId8"/>
+    <p:sldId id="270" r:id="rId9"/>
+    <p:sldId id="267" r:id="rId10"/>
+    <p:sldId id="266" r:id="rId11"/>
+    <p:sldId id="265" r:id="rId12"/>
+    <p:sldId id="264" r:id="rId13"/>
   </p:sldIdLst>
   <p:sldSz cx="12192000" cy="6858000"/>
   <p:notesSz cx="6858000" cy="9144000"/>
@@ -110,6 +115,11 @@
       </a:defRPr>
     </a:lvl9pPr>
   </p:defaultTextStyle>
+  <p:extLst>
+    <p:ext uri="{EFAFB233-063F-42B5-8137-9DF3F51BA10A}">
+      <p15:sldGuideLst xmlns:p15="http://schemas.microsoft.com/office/powerpoint/2012/main"/>
+    </p:ext>
+  </p:extLst>
 </p:presentation>
 </file>
 
@@ -189,7 +199,7 @@
           </a:lstStyle>
           <a:p>
             <a:r>
-              <a:rPr lang="en-US" smtClean="0"/>
+              <a:rPr lang="en-US"/>
               <a:t>Click to edit Master title style</a:t>
             </a:r>
             <a:endParaRPr lang="en-US" dirty="0"/>
@@ -285,7 +295,7 @@
           </a:lstStyle>
           <a:p>
             <a:r>
-              <a:rPr lang="en-US" smtClean="0"/>
+              <a:rPr lang="en-US"/>
               <a:t>Click to edit Master subtitle style</a:t>
             </a:r>
             <a:endParaRPr lang="en-US" dirty="0"/>
@@ -309,7 +319,7 @@
           <a:p>
             <a:fld id="{ECD19FB2-3AAB-4D03-B13A-2960828C78E3}" type="datetimeFigureOut">
               <a:rPr lang="en-US" dirty="0"/>
-              <a:t>7/10/2018</a:t>
+              <a:t>7/12/18</a:t>
             </a:fld>
             <a:endParaRPr lang="en-US" dirty="0"/>
           </a:p>
@@ -408,7 +418,7 @@
           </a:lstStyle>
           <a:p>
             <a:r>
-              <a:rPr lang="en-US" smtClean="0"/>
+              <a:rPr lang="en-US"/>
               <a:t>Click to edit Master title style</a:t>
             </a:r>
             <a:endParaRPr lang="en-US" dirty="0"/>
@@ -473,7 +483,7 @@
           </a:lstStyle>
           <a:p>
             <a:r>
-              <a:rPr lang="en-US" smtClean="0"/>
+              <a:rPr lang="en-US"/>
               <a:t>Click icon to add picture</a:t>
             </a:r>
             <a:endParaRPr lang="en-US" dirty="0"/>
@@ -563,7 +573,7 @@
           <a:p>
             <a:pPr lvl="0"/>
             <a:r>
-              <a:rPr lang="en-US" smtClean="0"/>
+              <a:rPr lang="en-US"/>
               <a:t>Click to edit Master text styles</a:t>
             </a:r>
           </a:p>
@@ -586,7 +596,7 @@
           <a:p>
             <a:fld id="{1B80C674-7DFC-42FE-B9CD-82963CDB1557}" type="datetimeFigureOut">
               <a:rPr lang="en-US" dirty="0"/>
-              <a:t>7/10/2018</a:t>
+              <a:t>7/12/18</a:t>
             </a:fld>
             <a:endParaRPr lang="en-US" dirty="0"/>
           </a:p>
@@ -684,7 +694,7 @@
           </a:lstStyle>
           <a:p>
             <a:r>
-              <a:rPr lang="en-US" smtClean="0"/>
+              <a:rPr lang="en-US"/>
               <a:t>Click to edit Master title style</a:t>
             </a:r>
             <a:endParaRPr lang="en-US" dirty="0"/>
@@ -750,7 +760,7 @@
           <a:p>
             <a:pPr lvl="0"/>
             <a:r>
-              <a:rPr lang="en-US" smtClean="0"/>
+              <a:rPr lang="en-US"/>
               <a:t>Click to edit Master text styles</a:t>
             </a:r>
           </a:p>
@@ -773,7 +783,7 @@
           <a:p>
             <a:fld id="{2076456F-F47D-4F25-8053-2A695DA0CA7D}" type="datetimeFigureOut">
               <a:rPr lang="en-US" dirty="0"/>
-              <a:t>7/10/2018</a:t>
+              <a:t>7/12/18</a:t>
             </a:fld>
             <a:endParaRPr lang="en-US" dirty="0"/>
           </a:p>
@@ -871,7 +881,7 @@
           </a:lstStyle>
           <a:p>
             <a:r>
-              <a:rPr lang="en-US" smtClean="0"/>
+              <a:rPr lang="en-US"/>
               <a:t>Click to edit Master title style</a:t>
             </a:r>
             <a:endParaRPr lang="en-US" dirty="0"/>
@@ -939,7 +949,7 @@
           <a:p>
             <a:pPr lvl="0"/>
             <a:r>
-              <a:rPr lang="en-US" smtClean="0"/>
+              <a:rPr lang="en-US"/>
               <a:t>Click to edit Master text styles</a:t>
             </a:r>
           </a:p>
@@ -1006,7 +1016,7 @@
           <a:p>
             <a:pPr lvl="0"/>
             <a:r>
-              <a:rPr lang="en-US" smtClean="0"/>
+              <a:rPr lang="en-US"/>
               <a:t>Click to edit Master text styles</a:t>
             </a:r>
           </a:p>
@@ -1029,7 +1039,7 @@
           <a:p>
             <a:fld id="{5D6C7379-69CC-4837-9905-BEBA22830C8A}" type="datetimeFigureOut">
               <a:rPr lang="en-US" dirty="0"/>
-              <a:t>7/10/2018</a:t>
+              <a:t>7/12/18</a:t>
             </a:fld>
             <a:endParaRPr lang="en-US" dirty="0"/>
           </a:p>
@@ -1361,7 +1371,7 @@
           </a:lstStyle>
           <a:p>
             <a:r>
-              <a:rPr lang="en-US" smtClean="0"/>
+              <a:rPr lang="en-US"/>
               <a:t>Click to edit Master title style</a:t>
             </a:r>
             <a:endParaRPr lang="en-US" dirty="0"/>
@@ -1427,7 +1437,7 @@
           <a:p>
             <a:pPr lvl="0"/>
             <a:r>
-              <a:rPr lang="en-US" smtClean="0"/>
+              <a:rPr lang="en-US"/>
               <a:t>Click to edit Master text styles</a:t>
             </a:r>
           </a:p>
@@ -1450,7 +1460,7 @@
           <a:p>
             <a:fld id="{49EB8B7E-8AEE-4F10-BFEE-C999AD004D36}" type="datetimeFigureOut">
               <a:rPr lang="en-US" dirty="0"/>
-              <a:t>7/10/2018</a:t>
+              <a:t>7/12/18</a:t>
             </a:fld>
             <a:endParaRPr lang="en-US" dirty="0"/>
           </a:p>
@@ -1544,7 +1554,7 @@
           <a:lstStyle/>
           <a:p>
             <a:r>
-              <a:rPr lang="en-US" smtClean="0"/>
+              <a:rPr lang="en-US"/>
               <a:t>Click to edit Master title style</a:t>
             </a:r>
             <a:endParaRPr lang="en-US" dirty="0"/>
@@ -1639,7 +1649,7 @@
           <a:p>
             <a:pPr lvl="0"/>
             <a:r>
-              <a:rPr lang="en-US" smtClean="0"/>
+              <a:rPr lang="en-US"/>
               <a:t>Click to edit Master text styles</a:t>
             </a:r>
           </a:p>
@@ -1706,7 +1716,7 @@
           <a:p>
             <a:pPr lvl="0"/>
             <a:r>
-              <a:rPr lang="en-US" smtClean="0"/>
+              <a:rPr lang="en-US"/>
               <a:t>Click to edit Master text styles</a:t>
             </a:r>
           </a:p>
@@ -1770,7 +1780,7 @@
               <a:buNone/>
             </a:pPr>
             <a:r>
-              <a:rPr lang="en-US" smtClean="0"/>
+              <a:rPr lang="en-US"/>
               <a:t>Click to edit Master text styles</a:t>
             </a:r>
           </a:p>
@@ -1837,7 +1847,7 @@
           <a:p>
             <a:pPr lvl="0"/>
             <a:r>
-              <a:rPr lang="en-US" smtClean="0"/>
+              <a:rPr lang="en-US"/>
               <a:t>Click to edit Master text styles</a:t>
             </a:r>
           </a:p>
@@ -1901,7 +1911,7 @@
               <a:buNone/>
             </a:pPr>
             <a:r>
-              <a:rPr lang="en-US" smtClean="0"/>
+              <a:rPr lang="en-US"/>
               <a:t>Click to edit Master text styles</a:t>
             </a:r>
           </a:p>
@@ -1968,7 +1978,7 @@
           <a:p>
             <a:pPr lvl="0"/>
             <a:r>
-              <a:rPr lang="en-US" smtClean="0"/>
+              <a:rPr lang="en-US"/>
               <a:t>Click to edit Master text styles</a:t>
             </a:r>
           </a:p>
@@ -1991,7 +2001,7 @@
           <a:p>
             <a:fld id="{8668F3F9-58BC-440B-B37B-805B9055EF92}" type="datetimeFigureOut">
               <a:rPr lang="en-US" dirty="0"/>
-              <a:t>7/10/2018</a:t>
+              <a:t>7/12/18</a:t>
             </a:fld>
             <a:endParaRPr lang="en-US" dirty="0"/>
           </a:p>
@@ -2085,7 +2095,7 @@
           <a:lstStyle/>
           <a:p>
             <a:r>
-              <a:rPr lang="en-US" smtClean="0"/>
+              <a:rPr lang="en-US"/>
               <a:t>Click to edit Master title style</a:t>
             </a:r>
             <a:endParaRPr lang="en-US" dirty="0"/>
@@ -2176,7 +2186,7 @@
           <a:p>
             <a:pPr lvl="0"/>
             <a:r>
-              <a:rPr lang="en-US" smtClean="0"/>
+              <a:rPr lang="en-US"/>
               <a:t>Click to edit Master text styles</a:t>
             </a:r>
           </a:p>
@@ -2254,7 +2264,7 @@
           </a:lstStyle>
           <a:p>
             <a:r>
-              <a:rPr lang="en-US" smtClean="0"/>
+              <a:rPr lang="en-US"/>
               <a:t>Click icon to add picture</a:t>
             </a:r>
             <a:endParaRPr lang="en-US" dirty="0"/>
@@ -2322,7 +2332,7 @@
           <a:p>
             <a:pPr lvl="0"/>
             <a:r>
-              <a:rPr lang="en-US" smtClean="0"/>
+              <a:rPr lang="en-US"/>
               <a:t>Click to edit Master text styles</a:t>
             </a:r>
           </a:p>
@@ -2412,7 +2422,7 @@
           <a:p>
             <a:pPr lvl="0"/>
             <a:r>
-              <a:rPr lang="en-US" smtClean="0"/>
+              <a:rPr lang="en-US"/>
               <a:t>Click to edit Master text styles</a:t>
             </a:r>
           </a:p>
@@ -2490,7 +2500,7 @@
           </a:lstStyle>
           <a:p>
             <a:r>
-              <a:rPr lang="en-US" smtClean="0"/>
+              <a:rPr lang="en-US"/>
               <a:t>Click icon to add picture</a:t>
             </a:r>
             <a:endParaRPr lang="en-US" dirty="0"/>
@@ -2558,7 +2568,7 @@
           <a:p>
             <a:pPr lvl="0"/>
             <a:r>
-              <a:rPr lang="en-US" smtClean="0"/>
+              <a:rPr lang="en-US"/>
               <a:t>Click to edit Master text styles</a:t>
             </a:r>
           </a:p>
@@ -2648,7 +2658,7 @@
           <a:p>
             <a:pPr lvl="0"/>
             <a:r>
-              <a:rPr lang="en-US" smtClean="0"/>
+              <a:rPr lang="en-US"/>
               <a:t>Click to edit Master text styles</a:t>
             </a:r>
           </a:p>
@@ -2726,7 +2736,7 @@
           </a:lstStyle>
           <a:p>
             <a:r>
-              <a:rPr lang="en-US" smtClean="0"/>
+              <a:rPr lang="en-US"/>
               <a:t>Click icon to add picture</a:t>
             </a:r>
             <a:endParaRPr lang="en-US" dirty="0"/>
@@ -2794,7 +2804,7 @@
           <a:p>
             <a:pPr lvl="0"/>
             <a:r>
-              <a:rPr lang="en-US" smtClean="0"/>
+              <a:rPr lang="en-US"/>
               <a:t>Click to edit Master text styles</a:t>
             </a:r>
           </a:p>
@@ -2817,7 +2827,7 @@
           <a:p>
             <a:fld id="{0D5A53AF-48EA-489D-8260-9DCAB666386A}" type="datetimeFigureOut">
               <a:rPr lang="en-US" dirty="0"/>
-              <a:t>7/10/2018</a:t>
+              <a:t>7/12/18</a:t>
             </a:fld>
             <a:endParaRPr lang="en-US" dirty="0"/>
           </a:p>
@@ -2906,7 +2916,7 @@
           <a:lstStyle/>
           <a:p>
             <a:r>
-              <a:rPr lang="en-US" smtClean="0"/>
+              <a:rPr lang="en-US"/>
               <a:t>Click to edit Master title style</a:t>
             </a:r>
             <a:endParaRPr lang="en-US" dirty="0"/>
@@ -2930,35 +2940,35 @@
           <a:p>
             <a:pPr lvl="0"/>
             <a:r>
-              <a:rPr lang="en-US" smtClean="0"/>
+              <a:rPr lang="en-US"/>
               <a:t>Click to edit Master text styles</a:t>
             </a:r>
           </a:p>
           <a:p>
             <a:pPr lvl="1"/>
             <a:r>
-              <a:rPr lang="en-US" smtClean="0"/>
+              <a:rPr lang="en-US"/>
               <a:t>Second level</a:t>
             </a:r>
           </a:p>
           <a:p>
             <a:pPr lvl="2"/>
             <a:r>
-              <a:rPr lang="en-US" smtClean="0"/>
+              <a:rPr lang="en-US"/>
               <a:t>Third level</a:t>
             </a:r>
           </a:p>
           <a:p>
             <a:pPr lvl="3"/>
             <a:r>
-              <a:rPr lang="en-US" smtClean="0"/>
+              <a:rPr lang="en-US"/>
               <a:t>Fourth level</a:t>
             </a:r>
           </a:p>
           <a:p>
             <a:pPr lvl="4"/>
             <a:r>
-              <a:rPr lang="en-US" smtClean="0"/>
+              <a:rPr lang="en-US"/>
               <a:t>Fifth level</a:t>
             </a:r>
             <a:endParaRPr lang="en-US" dirty="0"/>
@@ -2982,7 +2992,7 @@
           <a:p>
             <a:fld id="{0DED02AE-B9A4-47BD-AF8E-97E16144138B}" type="datetimeFigureOut">
               <a:rPr lang="en-US" dirty="0"/>
-              <a:t>7/10/2018</a:t>
+              <a:t>7/12/18</a:t>
             </a:fld>
             <a:endParaRPr lang="en-US" dirty="0"/>
           </a:p>
@@ -3076,7 +3086,7 @@
           <a:lstStyle/>
           <a:p>
             <a:r>
-              <a:rPr lang="en-US" smtClean="0"/>
+              <a:rPr lang="en-US"/>
               <a:t>Click to edit Master title style</a:t>
             </a:r>
             <a:endParaRPr lang="en-US" dirty="0"/>
@@ -3105,35 +3115,35 @@
           <a:p>
             <a:pPr lvl="0"/>
             <a:r>
-              <a:rPr lang="en-US" smtClean="0"/>
+              <a:rPr lang="en-US"/>
               <a:t>Click to edit Master text styles</a:t>
             </a:r>
           </a:p>
           <a:p>
             <a:pPr lvl="1"/>
             <a:r>
-              <a:rPr lang="en-US" smtClean="0"/>
+              <a:rPr lang="en-US"/>
               <a:t>Second level</a:t>
             </a:r>
           </a:p>
           <a:p>
             <a:pPr lvl="2"/>
             <a:r>
-              <a:rPr lang="en-US" smtClean="0"/>
+              <a:rPr lang="en-US"/>
               <a:t>Third level</a:t>
             </a:r>
           </a:p>
           <a:p>
             <a:pPr lvl="3"/>
             <a:r>
-              <a:rPr lang="en-US" smtClean="0"/>
+              <a:rPr lang="en-US"/>
               <a:t>Fourth level</a:t>
             </a:r>
           </a:p>
           <a:p>
             <a:pPr lvl="4"/>
             <a:r>
-              <a:rPr lang="en-US" smtClean="0"/>
+              <a:rPr lang="en-US"/>
               <a:t>Fifth level</a:t>
             </a:r>
             <a:endParaRPr lang="en-US" dirty="0"/>
@@ -3157,7 +3167,7 @@
           <a:p>
             <a:fld id="{CF0FD78B-DB02-4362-BCDC-98A55456977C}" type="datetimeFigureOut">
               <a:rPr lang="en-US" dirty="0"/>
-              <a:t>7/10/2018</a:t>
+              <a:t>7/12/18</a:t>
             </a:fld>
             <a:endParaRPr lang="en-US" dirty="0"/>
           </a:p>
@@ -3246,7 +3256,7 @@
           <a:lstStyle/>
           <a:p>
             <a:r>
-              <a:rPr lang="en-US" smtClean="0"/>
+              <a:rPr lang="en-US"/>
               <a:t>Click to edit Master title style</a:t>
             </a:r>
             <a:endParaRPr lang="en-US" dirty="0"/>
@@ -3270,35 +3280,35 @@
           <a:p>
             <a:pPr lvl="0"/>
             <a:r>
-              <a:rPr lang="en-US" smtClean="0"/>
+              <a:rPr lang="en-US"/>
               <a:t>Click to edit Master text styles</a:t>
             </a:r>
           </a:p>
           <a:p>
             <a:pPr lvl="1"/>
             <a:r>
-              <a:rPr lang="en-US" smtClean="0"/>
+              <a:rPr lang="en-US"/>
               <a:t>Second level</a:t>
             </a:r>
           </a:p>
           <a:p>
             <a:pPr lvl="2"/>
             <a:r>
-              <a:rPr lang="en-US" smtClean="0"/>
+              <a:rPr lang="en-US"/>
               <a:t>Third level</a:t>
             </a:r>
           </a:p>
           <a:p>
             <a:pPr lvl="3"/>
             <a:r>
-              <a:rPr lang="en-US" smtClean="0"/>
+              <a:rPr lang="en-US"/>
               <a:t>Fourth level</a:t>
             </a:r>
           </a:p>
           <a:p>
             <a:pPr lvl="4"/>
             <a:r>
-              <a:rPr lang="en-US" smtClean="0"/>
+              <a:rPr lang="en-US"/>
               <a:t>Fifth level</a:t>
             </a:r>
             <a:endParaRPr lang="en-US" dirty="0"/>
@@ -3322,7 +3332,7 @@
           <a:p>
             <a:fld id="{99916976-5D93-46E4-A98A-FAD63E4D0EA8}" type="datetimeFigureOut">
               <a:rPr lang="en-US" dirty="0"/>
-              <a:t>7/10/2018</a:t>
+              <a:t>7/12/18</a:t>
             </a:fld>
             <a:endParaRPr lang="en-US" dirty="0"/>
           </a:p>
@@ -3454,7 +3464,7 @@
           </a:lstStyle>
           <a:p>
             <a:r>
-              <a:rPr lang="en-US" smtClean="0"/>
+              <a:rPr lang="en-US"/>
               <a:t>Click to edit Master title style</a:t>
             </a:r>
             <a:endParaRPr lang="en-US" dirty="0"/>
@@ -3550,7 +3560,7 @@
           </a:lstStyle>
           <a:p>
             <a:r>
-              <a:rPr lang="en-US" smtClean="0"/>
+              <a:rPr lang="en-US"/>
               <a:t>Click to edit Master subtitle style</a:t>
             </a:r>
             <a:endParaRPr lang="en-US" dirty="0"/>
@@ -3574,7 +3584,7 @@
           <a:p>
             <a:fld id="{0F39F4F5-F4D2-4D2A-AB60-88D37ADCB869}" type="datetimeFigureOut">
               <a:rPr lang="en-US" dirty="0"/>
-              <a:t>7/10/2018</a:t>
+              <a:t>7/12/18</a:t>
             </a:fld>
             <a:endParaRPr lang="en-US" dirty="0"/>
           </a:p>
@@ -3663,7 +3673,7 @@
           <a:lstStyle/>
           <a:p>
             <a:r>
-              <a:rPr lang="en-US" smtClean="0"/>
+              <a:rPr lang="en-US"/>
               <a:t>Click to edit Master title style</a:t>
             </a:r>
             <a:endParaRPr lang="en-US" dirty="0"/>
@@ -3692,35 +3702,35 @@
           <a:p>
             <a:pPr lvl="0"/>
             <a:r>
-              <a:rPr lang="en-US" smtClean="0"/>
+              <a:rPr lang="en-US"/>
               <a:t>Click to edit Master text styles</a:t>
             </a:r>
           </a:p>
           <a:p>
             <a:pPr lvl="1"/>
             <a:r>
-              <a:rPr lang="en-US" smtClean="0"/>
+              <a:rPr lang="en-US"/>
               <a:t>Second level</a:t>
             </a:r>
           </a:p>
           <a:p>
             <a:pPr lvl="2"/>
             <a:r>
-              <a:rPr lang="en-US" smtClean="0"/>
+              <a:rPr lang="en-US"/>
               <a:t>Third level</a:t>
             </a:r>
           </a:p>
           <a:p>
             <a:pPr lvl="3"/>
             <a:r>
-              <a:rPr lang="en-US" smtClean="0"/>
+              <a:rPr lang="en-US"/>
               <a:t>Fourth level</a:t>
             </a:r>
           </a:p>
           <a:p>
             <a:pPr lvl="4"/>
             <a:r>
-              <a:rPr lang="en-US" smtClean="0"/>
+              <a:rPr lang="en-US"/>
               <a:t>Fifth level</a:t>
             </a:r>
             <a:endParaRPr lang="en-US" dirty="0"/>
@@ -3749,35 +3759,35 @@
           <a:p>
             <a:pPr lvl="0"/>
             <a:r>
-              <a:rPr lang="en-US" smtClean="0"/>
+              <a:rPr lang="en-US"/>
               <a:t>Click to edit Master text styles</a:t>
             </a:r>
           </a:p>
           <a:p>
             <a:pPr lvl="1"/>
             <a:r>
-              <a:rPr lang="en-US" smtClean="0"/>
+              <a:rPr lang="en-US"/>
               <a:t>Second level</a:t>
             </a:r>
           </a:p>
           <a:p>
             <a:pPr lvl="2"/>
             <a:r>
-              <a:rPr lang="en-US" smtClean="0"/>
+              <a:rPr lang="en-US"/>
               <a:t>Third level</a:t>
             </a:r>
           </a:p>
           <a:p>
             <a:pPr lvl="3"/>
             <a:r>
-              <a:rPr lang="en-US" smtClean="0"/>
+              <a:rPr lang="en-US"/>
               <a:t>Fourth level</a:t>
             </a:r>
           </a:p>
           <a:p>
             <a:pPr lvl="4"/>
             <a:r>
-              <a:rPr lang="en-US" smtClean="0"/>
+              <a:rPr lang="en-US"/>
               <a:t>Fifth level</a:t>
             </a:r>
             <a:endParaRPr lang="en-US" dirty="0"/>
@@ -3801,7 +3811,7 @@
           <a:p>
             <a:fld id="{D23BC6CE-6D1E-47E5-8859-F31AC5380EB2}" type="datetimeFigureOut">
               <a:rPr lang="en-US" dirty="0"/>
-              <a:t>7/10/2018</a:t>
+              <a:t>7/12/18</a:t>
             </a:fld>
             <a:endParaRPr lang="en-US" dirty="0"/>
           </a:p>
@@ -3895,7 +3905,7 @@
           <a:lstStyle/>
           <a:p>
             <a:r>
-              <a:rPr lang="en-US" smtClean="0"/>
+              <a:rPr lang="en-US"/>
               <a:t>Click to edit Master title style</a:t>
             </a:r>
             <a:endParaRPr lang="en-US" dirty="0"/>
@@ -3988,7 +3998,7 @@
           <a:p>
             <a:pPr lvl="0"/>
             <a:r>
-              <a:rPr lang="en-US" smtClean="0"/>
+              <a:rPr lang="en-US"/>
               <a:t>Click to edit Master text styles</a:t>
             </a:r>
           </a:p>
@@ -4016,35 +4026,35 @@
           <a:p>
             <a:pPr lvl="0"/>
             <a:r>
-              <a:rPr lang="en-US" smtClean="0"/>
+              <a:rPr lang="en-US"/>
               <a:t>Click to edit Master text styles</a:t>
             </a:r>
           </a:p>
           <a:p>
             <a:pPr lvl="1"/>
             <a:r>
-              <a:rPr lang="en-US" smtClean="0"/>
+              <a:rPr lang="en-US"/>
               <a:t>Second level</a:t>
             </a:r>
           </a:p>
           <a:p>
             <a:pPr lvl="2"/>
             <a:r>
-              <a:rPr lang="en-US" smtClean="0"/>
+              <a:rPr lang="en-US"/>
               <a:t>Third level</a:t>
             </a:r>
           </a:p>
           <a:p>
             <a:pPr lvl="3"/>
             <a:r>
-              <a:rPr lang="en-US" smtClean="0"/>
+              <a:rPr lang="en-US"/>
               <a:t>Fourth level</a:t>
             </a:r>
           </a:p>
           <a:p>
             <a:pPr lvl="4"/>
             <a:r>
-              <a:rPr lang="en-US" smtClean="0"/>
+              <a:rPr lang="en-US"/>
               <a:t>Fifth level</a:t>
             </a:r>
             <a:endParaRPr lang="en-US" dirty="0"/>
@@ -4109,7 +4119,7 @@
               <a:buNone/>
             </a:pPr>
             <a:r>
-              <a:rPr lang="en-US" smtClean="0"/>
+              <a:rPr lang="en-US"/>
               <a:t>Click to edit Master text styles</a:t>
             </a:r>
           </a:p>
@@ -4137,35 +4147,35 @@
           <a:p>
             <a:pPr lvl="0"/>
             <a:r>
-              <a:rPr lang="en-US" smtClean="0"/>
+              <a:rPr lang="en-US"/>
               <a:t>Click to edit Master text styles</a:t>
             </a:r>
           </a:p>
           <a:p>
             <a:pPr lvl="1"/>
             <a:r>
-              <a:rPr lang="en-US" smtClean="0"/>
+              <a:rPr lang="en-US"/>
               <a:t>Second level</a:t>
             </a:r>
           </a:p>
           <a:p>
             <a:pPr lvl="2"/>
             <a:r>
-              <a:rPr lang="en-US" smtClean="0"/>
+              <a:rPr lang="en-US"/>
               <a:t>Third level</a:t>
             </a:r>
           </a:p>
           <a:p>
             <a:pPr lvl="3"/>
             <a:r>
-              <a:rPr lang="en-US" smtClean="0"/>
+              <a:rPr lang="en-US"/>
               <a:t>Fourth level</a:t>
             </a:r>
           </a:p>
           <a:p>
             <a:pPr lvl="4"/>
             <a:r>
-              <a:rPr lang="en-US" smtClean="0"/>
+              <a:rPr lang="en-US"/>
               <a:t>Fifth level</a:t>
             </a:r>
             <a:endParaRPr lang="en-US" dirty="0"/>
@@ -4189,7 +4199,7 @@
           <a:p>
             <a:fld id="{B1B4E7C4-4DA4-404D-9965-B13F2DD7D8BF}" type="datetimeFigureOut">
               <a:rPr lang="en-US" dirty="0"/>
-              <a:t>7/10/2018</a:t>
+              <a:t>7/12/18</a:t>
             </a:fld>
             <a:endParaRPr lang="en-US" dirty="0"/>
           </a:p>
@@ -4278,7 +4288,7 @@
           <a:lstStyle/>
           <a:p>
             <a:r>
-              <a:rPr lang="en-US" smtClean="0"/>
+              <a:rPr lang="en-US"/>
               <a:t>Click to edit Master title style</a:t>
             </a:r>
             <a:endParaRPr lang="en-US" dirty="0"/>
@@ -4302,7 +4312,7 @@
           <a:p>
             <a:fld id="{476FB7AA-4A53-424F-AD41-70827B6504BA}" type="datetimeFigureOut">
               <a:rPr lang="en-US" dirty="0"/>
-              <a:t>7/10/2018</a:t>
+              <a:t>7/12/18</a:t>
             </a:fld>
             <a:endParaRPr lang="en-US" dirty="0"/>
           </a:p>
@@ -4392,7 +4402,7 @@
           <a:p>
             <a:fld id="{E7884882-FB12-4BC8-9960-9AD8104D7FAE}" type="datetimeFigureOut">
               <a:rPr lang="en-US" dirty="0"/>
-              <a:t>7/10/2018</a:t>
+              <a:t>7/12/18</a:t>
             </a:fld>
             <a:endParaRPr lang="en-US" dirty="0"/>
           </a:p>
@@ -4490,7 +4500,7 @@
           </a:lstStyle>
           <a:p>
             <a:r>
-              <a:rPr lang="en-US" smtClean="0"/>
+              <a:rPr lang="en-US"/>
               <a:t>Click to edit Master title style</a:t>
             </a:r>
             <a:endParaRPr lang="en-US" dirty="0"/>
@@ -4519,35 +4529,35 @@
           <a:p>
             <a:pPr lvl="0"/>
             <a:r>
-              <a:rPr lang="en-US" smtClean="0"/>
+              <a:rPr lang="en-US"/>
               <a:t>Click to edit Master text styles</a:t>
             </a:r>
           </a:p>
           <a:p>
             <a:pPr lvl="1"/>
             <a:r>
-              <a:rPr lang="en-US" smtClean="0"/>
+              <a:rPr lang="en-US"/>
               <a:t>Second level</a:t>
             </a:r>
           </a:p>
           <a:p>
             <a:pPr lvl="2"/>
             <a:r>
-              <a:rPr lang="en-US" smtClean="0"/>
+              <a:rPr lang="en-US"/>
               <a:t>Third level</a:t>
             </a:r>
           </a:p>
           <a:p>
             <a:pPr lvl="3"/>
             <a:r>
-              <a:rPr lang="en-US" smtClean="0"/>
+              <a:rPr lang="en-US"/>
               <a:t>Fourth level</a:t>
             </a:r>
           </a:p>
           <a:p>
             <a:pPr lvl="4"/>
             <a:r>
-              <a:rPr lang="en-US" smtClean="0"/>
+              <a:rPr lang="en-US"/>
               <a:t>Fifth level</a:t>
             </a:r>
             <a:endParaRPr lang="en-US" dirty="0"/>
@@ -4637,7 +4647,7 @@
           <a:p>
             <a:pPr lvl="0"/>
             <a:r>
-              <a:rPr lang="en-US" smtClean="0"/>
+              <a:rPr lang="en-US"/>
               <a:t>Click to edit Master text styles</a:t>
             </a:r>
           </a:p>
@@ -4660,7 +4670,7 @@
           <a:p>
             <a:fld id="{F7D1BD23-6E54-4D9D-AD88-A2813C73CC25}" type="datetimeFigureOut">
               <a:rPr lang="en-US" dirty="0"/>
-              <a:t>7/10/2018</a:t>
+              <a:t>7/12/18</a:t>
             </a:fld>
             <a:endParaRPr lang="en-US" dirty="0"/>
           </a:p>
@@ -4758,7 +4768,7 @@
           </a:lstStyle>
           <a:p>
             <a:r>
-              <a:rPr lang="en-US" smtClean="0"/>
+              <a:rPr lang="en-US"/>
               <a:t>Click to edit Master title style</a:t>
             </a:r>
             <a:endParaRPr lang="en-US" dirty="0"/>
@@ -4823,7 +4833,7 @@
           </a:lstStyle>
           <a:p>
             <a:r>
-              <a:rPr lang="en-US" smtClean="0"/>
+              <a:rPr lang="en-US"/>
               <a:t>Click icon to add picture</a:t>
             </a:r>
             <a:endParaRPr lang="en-US" dirty="0"/>
@@ -4913,7 +4923,7 @@
           <a:p>
             <a:pPr lvl="0"/>
             <a:r>
-              <a:rPr lang="en-US" smtClean="0"/>
+              <a:rPr lang="en-US"/>
               <a:t>Click to edit Master text styles</a:t>
             </a:r>
           </a:p>
@@ -4936,7 +4946,7 @@
           <a:p>
             <a:fld id="{1471A834-4F3C-4AF9-9C74-05EC35A0F292}" type="datetimeFigureOut">
               <a:rPr lang="en-US" dirty="0"/>
-              <a:t>7/10/2018</a:t>
+              <a:t>7/12/18</a:t>
             </a:fld>
             <a:endParaRPr lang="en-US" dirty="0"/>
           </a:p>
@@ -5049,7 +5059,7 @@
           <a:lstStyle/>
           <a:p>
             <a:r>
-              <a:rPr lang="en-US" smtClean="0"/>
+              <a:rPr lang="en-US"/>
               <a:t>Click to edit Master title style</a:t>
             </a:r>
             <a:endParaRPr lang="en-US" dirty="0"/>
@@ -5083,35 +5093,35 @@
           <a:p>
             <a:pPr lvl="0"/>
             <a:r>
-              <a:rPr lang="en-US" smtClean="0"/>
+              <a:rPr lang="en-US"/>
               <a:t>Click to edit Master text styles</a:t>
             </a:r>
           </a:p>
           <a:p>
             <a:pPr lvl="1"/>
             <a:r>
-              <a:rPr lang="en-US" smtClean="0"/>
+              <a:rPr lang="en-US"/>
               <a:t>Second level</a:t>
             </a:r>
           </a:p>
           <a:p>
             <a:pPr lvl="2"/>
             <a:r>
-              <a:rPr lang="en-US" smtClean="0"/>
+              <a:rPr lang="en-US"/>
               <a:t>Third level</a:t>
             </a:r>
           </a:p>
           <a:p>
             <a:pPr lvl="3"/>
             <a:r>
-              <a:rPr lang="en-US" smtClean="0"/>
+              <a:rPr lang="en-US"/>
               <a:t>Fourth level</a:t>
             </a:r>
           </a:p>
           <a:p>
             <a:pPr lvl="4"/>
             <a:r>
-              <a:rPr lang="en-US" smtClean="0"/>
+              <a:rPr lang="en-US"/>
               <a:t>Fifth level</a:t>
             </a:r>
             <a:endParaRPr lang="en-US" dirty="0"/>
@@ -5171,7 +5181,7 @@
           <a:p>
             <a:fld id="{51CF1133-3259-4C45-BABA-5B62D9C6F78D}" type="datetimeFigureOut">
               <a:rPr lang="en-US" dirty="0"/>
-              <a:t>7/10/2018</a:t>
+              <a:t>7/12/18</a:t>
             </a:fld>
             <a:endParaRPr lang="en-US" dirty="0"/>
           </a:p>
@@ -5751,10 +5761,9 @@
           <a:lstStyle/>
           <a:p>
             <a:r>
-              <a:rPr lang="en-US" dirty="0" smtClean="0"/>
+              <a:rPr lang="en-US" dirty="0"/>
               <a:t>Anomaly Detection</a:t>
             </a:r>
-            <a:endParaRPr lang="en-US" dirty="0"/>
           </a:p>
         </p:txBody>
       </p:sp>
@@ -5780,10 +5789,9 @@
           <a:p>
             <a:pPr algn="l"/>
             <a:r>
-              <a:rPr lang="en-US" dirty="0" smtClean="0"/>
+              <a:rPr lang="en-US" dirty="0"/>
               <a:t>Final Project</a:t>
             </a:r>
-            <a:endParaRPr lang="en-US" dirty="0"/>
           </a:p>
         </p:txBody>
       </p:sp>
@@ -5791,6 +5799,238 @@
     <p:extLst>
       <p:ext uri="{BB962C8B-B14F-4D97-AF65-F5344CB8AC3E}">
         <p14:creationId xmlns:p14="http://schemas.microsoft.com/office/powerpoint/2010/main" val="3648454805"/>
+      </p:ext>
+    </p:extLst>
+  </p:cSld>
+  <p:clrMapOvr>
+    <a:masterClrMapping/>
+  </p:clrMapOvr>
+</p:sld>
+</file>
+
+<file path=ppt/slides/slide10.xml><?xml version="1.0" encoding="utf-8"?>
+<p:sld xmlns:a="http://schemas.openxmlformats.org/drawingml/2006/main" xmlns:r="http://schemas.openxmlformats.org/officeDocument/2006/relationships" xmlns:p="http://schemas.openxmlformats.org/presentationml/2006/main">
+  <p:cSld>
+    <p:spTree>
+      <p:nvGrpSpPr>
+        <p:cNvPr id="1" name=""/>
+        <p:cNvGrpSpPr/>
+        <p:nvPr/>
+      </p:nvGrpSpPr>
+      <p:grpSpPr>
+        <a:xfrm>
+          <a:off x="0" y="0"/>
+          <a:ext cx="0" cy="0"/>
+          <a:chOff x="0" y="0"/>
+          <a:chExt cx="0" cy="0"/>
+        </a:xfrm>
+      </p:grpSpPr>
+      <p:sp>
+        <p:nvSpPr>
+          <p:cNvPr id="2" name="Title 1">
+            <a:extLst>
+              <a:ext uri="{FF2B5EF4-FFF2-40B4-BE49-F238E27FC236}">
+                <a16:creationId xmlns:a16="http://schemas.microsoft.com/office/drawing/2014/main" id="{F46194D3-9801-CE4F-A699-B825214D9905}"/>
+              </a:ext>
+            </a:extLst>
+          </p:cNvPr>
+          <p:cNvSpPr>
+            <a:spLocks noGrp="1"/>
+          </p:cNvSpPr>
+          <p:nvPr>
+            <p:ph type="title"/>
+          </p:nvPr>
+        </p:nvSpPr>
+        <p:spPr/>
+        <p:txBody>
+          <a:bodyPr/>
+          <a:lstStyle/>
+          <a:p>
+            <a:r>
+              <a:rPr lang="en-US" dirty="0"/>
+              <a:t>Questions?</a:t>
+            </a:r>
+          </a:p>
+        </p:txBody>
+      </p:sp>
+      <p:sp>
+        <p:nvSpPr>
+          <p:cNvPr id="3" name="Content Placeholder 2">
+            <a:extLst>
+              <a:ext uri="{FF2B5EF4-FFF2-40B4-BE49-F238E27FC236}">
+                <a16:creationId xmlns:a16="http://schemas.microsoft.com/office/drawing/2014/main" id="{710CB1EF-35CA-0E48-9587-1E2BDA0D02DA}"/>
+              </a:ext>
+            </a:extLst>
+          </p:cNvPr>
+          <p:cNvSpPr>
+            <a:spLocks noGrp="1"/>
+          </p:cNvSpPr>
+          <p:nvPr>
+            <p:ph idx="1"/>
+          </p:nvPr>
+        </p:nvSpPr>
+        <p:spPr/>
+        <p:txBody>
+          <a:bodyPr/>
+          <a:lstStyle/>
+          <a:p>
+            <a:endParaRPr lang="en-US"/>
+          </a:p>
+        </p:txBody>
+      </p:sp>
+    </p:spTree>
+    <p:extLst>
+      <p:ext uri="{BB962C8B-B14F-4D97-AF65-F5344CB8AC3E}">
+        <p14:creationId xmlns:p14="http://schemas.microsoft.com/office/powerpoint/2010/main" val="1377582353"/>
+      </p:ext>
+    </p:extLst>
+  </p:cSld>
+  <p:clrMapOvr>
+    <a:masterClrMapping/>
+  </p:clrMapOvr>
+</p:sld>
+</file>
+
+<file path=ppt/slides/slide11.xml><?xml version="1.0" encoding="utf-8"?>
+<p:sld xmlns:a="http://schemas.openxmlformats.org/drawingml/2006/main" xmlns:r="http://schemas.openxmlformats.org/officeDocument/2006/relationships" xmlns:p="http://schemas.openxmlformats.org/presentationml/2006/main">
+  <p:cSld>
+    <p:spTree>
+      <p:nvGrpSpPr>
+        <p:cNvPr id="1" name=""/>
+        <p:cNvGrpSpPr/>
+        <p:nvPr/>
+      </p:nvGrpSpPr>
+      <p:grpSpPr>
+        <a:xfrm>
+          <a:off x="0" y="0"/>
+          <a:ext cx="0" cy="0"/>
+          <a:chOff x="0" y="0"/>
+          <a:chExt cx="0" cy="0"/>
+        </a:xfrm>
+      </p:grpSpPr>
+      <p:sp>
+        <p:nvSpPr>
+          <p:cNvPr id="2" name="Title 1"/>
+          <p:cNvSpPr>
+            <a:spLocks noGrp="1"/>
+          </p:cNvSpPr>
+          <p:nvPr>
+            <p:ph type="title"/>
+          </p:nvPr>
+        </p:nvSpPr>
+        <p:spPr/>
+        <p:txBody>
+          <a:bodyPr/>
+          <a:lstStyle/>
+          <a:p>
+            <a:endParaRPr lang="en-US" dirty="0"/>
+          </a:p>
+        </p:txBody>
+      </p:sp>
+      <p:pic>
+        <p:nvPicPr>
+          <p:cNvPr id="4" name="Content Placeholder 3">
+            <a:extLst>
+              <a:ext uri="{FF2B5EF4-FFF2-40B4-BE49-F238E27FC236}">
+                <a16:creationId xmlns:a16="http://schemas.microsoft.com/office/drawing/2014/main" id="{1939D8B5-0272-1F43-94B1-B6BCD87420A4}"/>
+              </a:ext>
+            </a:extLst>
+          </p:cNvPr>
+          <p:cNvPicPr>
+            <a:picLocks noGrp="1" noChangeAspect="1"/>
+          </p:cNvPicPr>
+          <p:nvPr>
+            <p:ph idx="1"/>
+          </p:nvPr>
+        </p:nvPicPr>
+        <p:blipFill>
+          <a:blip r:embed="rId2"/>
+          <a:stretch>
+            <a:fillRect/>
+          </a:stretch>
+        </p:blipFill>
+        <p:spPr>
+          <a:xfrm>
+            <a:off x="1435768" y="1883193"/>
+            <a:ext cx="9320463" cy="3326606"/>
+          </a:xfrm>
+          <a:prstGeom prst="rect">
+            <a:avLst/>
+          </a:prstGeom>
+        </p:spPr>
+      </p:pic>
+    </p:spTree>
+    <p:extLst>
+      <p:ext uri="{BB962C8B-B14F-4D97-AF65-F5344CB8AC3E}">
+        <p14:creationId xmlns:p14="http://schemas.microsoft.com/office/powerpoint/2010/main" val="3784181988"/>
+      </p:ext>
+    </p:extLst>
+  </p:cSld>
+  <p:clrMapOvr>
+    <a:masterClrMapping/>
+  </p:clrMapOvr>
+</p:sld>
+</file>
+
+<file path=ppt/slides/slide12.xml><?xml version="1.0" encoding="utf-8"?>
+<p:sld xmlns:a="http://schemas.openxmlformats.org/drawingml/2006/main" xmlns:r="http://schemas.openxmlformats.org/officeDocument/2006/relationships" xmlns:p="http://schemas.openxmlformats.org/presentationml/2006/main">
+  <p:cSld>
+    <p:spTree>
+      <p:nvGrpSpPr>
+        <p:cNvPr id="1" name=""/>
+        <p:cNvGrpSpPr/>
+        <p:nvPr/>
+      </p:nvGrpSpPr>
+      <p:grpSpPr>
+        <a:xfrm>
+          <a:off x="0" y="0"/>
+          <a:ext cx="0" cy="0"/>
+          <a:chOff x="0" y="0"/>
+          <a:chExt cx="0" cy="0"/>
+        </a:xfrm>
+      </p:grpSpPr>
+      <p:sp>
+        <p:nvSpPr>
+          <p:cNvPr id="2" name="Title 1"/>
+          <p:cNvSpPr>
+            <a:spLocks noGrp="1"/>
+          </p:cNvSpPr>
+          <p:nvPr>
+            <p:ph type="title"/>
+          </p:nvPr>
+        </p:nvSpPr>
+        <p:spPr/>
+        <p:txBody>
+          <a:bodyPr/>
+          <a:lstStyle/>
+          <a:p>
+            <a:endParaRPr lang="en-US" dirty="0"/>
+          </a:p>
+        </p:txBody>
+      </p:sp>
+      <p:sp>
+        <p:nvSpPr>
+          <p:cNvPr id="3" name="Content Placeholder 2"/>
+          <p:cNvSpPr>
+            <a:spLocks noGrp="1"/>
+          </p:cNvSpPr>
+          <p:nvPr>
+            <p:ph idx="1"/>
+          </p:nvPr>
+        </p:nvSpPr>
+        <p:spPr/>
+        <p:txBody>
+          <a:bodyPr/>
+          <a:lstStyle/>
+          <a:p>
+            <a:endParaRPr lang="en-US"/>
+          </a:p>
+        </p:txBody>
+      </p:sp>
+    </p:spTree>
+    <p:extLst>
+      <p:ext uri="{BB962C8B-B14F-4D97-AF65-F5344CB8AC3E}">
+        <p14:creationId xmlns:p14="http://schemas.microsoft.com/office/powerpoint/2010/main" val="3332505446"/>
       </p:ext>
     </p:extLst>
   </p:cSld>
@@ -5833,10 +6073,9 @@
           <a:lstStyle/>
           <a:p>
             <a:r>
-              <a:rPr lang="en-US" dirty="0" smtClean="0"/>
+              <a:rPr lang="en-US" dirty="0"/>
               <a:t>Team</a:t>
             </a:r>
-            <a:endParaRPr lang="en-US" dirty="0"/>
           </a:p>
         </p:txBody>
       </p:sp>
@@ -5861,11 +6100,7 @@
             </a:pPr>
             <a:r>
               <a:rPr lang="en-US" sz="4400" dirty="0"/>
-              <a:t>Bill </a:t>
-            </a:r>
-            <a:r>
-              <a:rPr lang="en-US" sz="4400" dirty="0" smtClean="0"/>
-              <a:t>Wilson</a:t>
+              <a:t>Bill Wilson</a:t>
             </a:r>
           </a:p>
           <a:p>
@@ -5874,7 +6109,7 @@
               <a:buChar char="§"/>
             </a:pPr>
             <a:r>
-              <a:rPr lang="en-US" sz="4400" dirty="0" smtClean="0"/>
+              <a:rPr lang="en-US" sz="4400" dirty="0"/>
               <a:t>Nish Garg</a:t>
             </a:r>
           </a:p>
@@ -5884,12 +6119,8 @@
               <a:buChar char="§"/>
             </a:pPr>
             <a:r>
-              <a:rPr lang="en-US" sz="4400" dirty="0" smtClean="0"/>
+              <a:rPr lang="en-US" sz="4400" dirty="0"/>
               <a:t>Aditi Sharma</a:t>
-            </a:r>
-            <a:r>
-              <a:rPr lang="en-US" dirty="0"/>
-              <a:t/>
             </a:r>
             <a:br>
               <a:rPr lang="en-US" dirty="0"/>
@@ -5944,10 +6175,9 @@
           <a:lstStyle/>
           <a:p>
             <a:r>
-              <a:rPr lang="en-US" dirty="0" smtClean="0"/>
+              <a:rPr lang="en-US" dirty="0"/>
               <a:t>Initial Thoughts</a:t>
             </a:r>
-            <a:endParaRPr lang="en-US" dirty="0"/>
           </a:p>
         </p:txBody>
       </p:sp>
@@ -5963,17 +6193,16 @@
         </p:nvSpPr>
         <p:spPr/>
         <p:txBody>
-          <a:bodyPr/>
+          <a:bodyPr>
+            <a:normAutofit/>
+          </a:bodyPr>
           <a:lstStyle/>
           <a:p>
             <a:pPr>
               <a:buFont typeface="Wingdings" panose="05000000000000000000" pitchFamily="2" charset="2"/>
               <a:buChar char="§"/>
             </a:pPr>
-            <a:r>
-              <a:rPr lang="en-US" sz="3600" dirty="0" smtClean="0"/>
-              <a:t>Self-Learning</a:t>
-            </a:r>
+            <a:endParaRPr lang="en-US" sz="3600" dirty="0"/>
           </a:p>
           <a:p>
             <a:pPr>
@@ -5981,7 +6210,7 @@
               <a:buChar char="§"/>
             </a:pPr>
             <a:r>
-              <a:rPr lang="en-US" sz="3600" dirty="0" smtClean="0"/>
+              <a:rPr lang="en-US" sz="3600" dirty="0"/>
               <a:t>Create a solution which is not product or industry specific</a:t>
             </a:r>
           </a:p>
@@ -5990,19 +6219,16 @@
               <a:buFont typeface="Wingdings" panose="05000000000000000000" pitchFamily="2" charset="2"/>
               <a:buChar char="§"/>
             </a:pPr>
-            <a:r>
-              <a:rPr lang="en-US" sz="3600" dirty="0" smtClean="0"/>
-              <a:t>Take it easy </a:t>
-            </a:r>
-            <a:r>
-              <a:rPr lang="en-US" sz="3600" dirty="0" smtClean="0">
-                <a:sym typeface="Wingdings" panose="05000000000000000000" pitchFamily="2" charset="2"/>
-              </a:rPr>
-              <a:t> </a:t>
-            </a:r>
-            <a:r>
-              <a:rPr lang="en-US" dirty="0"/>
-              <a:t/>
+            <a:endParaRPr lang="en-US" sz="3600" dirty="0"/>
+          </a:p>
+          <a:p>
+            <a:pPr>
+              <a:buFont typeface="Wingdings" panose="05000000000000000000" pitchFamily="2" charset="2"/>
+              <a:buChar char="§"/>
+            </a:pPr>
+            <a:r>
+              <a:rPr lang="en-US" sz="3600" dirty="0"/>
+              <a:t>Self Learning and division of work</a:t>
             </a:r>
             <a:br>
               <a:rPr lang="en-US" dirty="0"/>
@@ -6057,10 +6283,9 @@
           <a:lstStyle/>
           <a:p>
             <a:r>
-              <a:rPr lang="en-US" dirty="0" smtClean="0"/>
+              <a:rPr lang="en-US" dirty="0"/>
               <a:t>Technologies Used</a:t>
             </a:r>
-            <a:endParaRPr lang="en-US" dirty="0"/>
           </a:p>
         </p:txBody>
       </p:sp>
@@ -6077,7 +6302,7 @@
         <p:spPr/>
         <p:txBody>
           <a:bodyPr>
-            <a:normAutofit/>
+            <a:normAutofit lnSpcReduction="10000"/>
           </a:bodyPr>
           <a:lstStyle/>
           <a:p>
@@ -6086,8 +6311,24 @@
               <a:buChar char="§"/>
             </a:pPr>
             <a:r>
-              <a:rPr lang="en-US" sz="3600" dirty="0" smtClean="0"/>
-              <a:t>ML programming- Python</a:t>
+              <a:rPr lang="en-US" sz="3600" dirty="0"/>
+              <a:t>ML programming- Python, </a:t>
+            </a:r>
+            <a:r>
+              <a:rPr lang="en-US" sz="3600" dirty="0" err="1"/>
+              <a:t>mpu</a:t>
+            </a:r>
+            <a:r>
+              <a:rPr lang="en-US" sz="3600" dirty="0"/>
+              <a:t>, </a:t>
+            </a:r>
+            <a:r>
+              <a:rPr lang="en-US" sz="3600" dirty="0" err="1"/>
+              <a:t>scikit</a:t>
+            </a:r>
+            <a:r>
+              <a:rPr lang="en-US" sz="3600" dirty="0"/>
+              <a:t>-learn</a:t>
             </a:r>
           </a:p>
           <a:p>
@@ -6096,7 +6337,7 @@
               <a:buChar char="§"/>
             </a:pPr>
             <a:r>
-              <a:rPr lang="en-US" sz="3600" dirty="0" smtClean="0"/>
+              <a:rPr lang="en-US" sz="3600" dirty="0"/>
               <a:t>JavaScript – D3, jQuery</a:t>
             </a:r>
           </a:p>
@@ -6106,12 +6347,8 @@
               <a:buChar char="§"/>
             </a:pPr>
             <a:r>
-              <a:rPr lang="en-US" sz="3600" dirty="0" smtClean="0"/>
-              <a:t>UX design: HTML, CSS, </a:t>
-            </a:r>
-            <a:r>
               <a:rPr lang="en-US" sz="3600" dirty="0"/>
-              <a:t>Bootstrap</a:t>
+              <a:t>UX design: HTML, CSS, Bootstrap</a:t>
             </a:r>
           </a:p>
           <a:p>
@@ -6120,7 +6357,7 @@
               <a:buChar char="§"/>
             </a:pPr>
             <a:r>
-              <a:rPr lang="en-US" sz="3600" dirty="0" smtClean="0"/>
+              <a:rPr lang="en-US" sz="3600" dirty="0"/>
               <a:t>Flask</a:t>
             </a:r>
           </a:p>
@@ -6130,19 +6367,20 @@
               <a:buChar char="§"/>
             </a:pPr>
             <a:r>
-              <a:rPr lang="en-US" sz="3600" dirty="0" err="1" smtClean="0"/>
+              <a:rPr lang="en-US" sz="3600" dirty="0"/>
               <a:t>Heroku</a:t>
             </a:r>
-            <a:endParaRPr lang="en-US" sz="3600" dirty="0" smtClean="0"/>
           </a:p>
           <a:p>
             <a:pPr marL="0" indent="0">
               <a:buNone/>
             </a:pPr>
-            <a:r>
-              <a:rPr lang="en-US" dirty="0"/>
-              <a:t/>
-            </a:r>
+            <a:endParaRPr lang="en-US" sz="3600" dirty="0"/>
+          </a:p>
+          <a:p>
+            <a:pPr marL="0" indent="0">
+              <a:buNone/>
+            </a:pPr>
             <a:br>
               <a:rPr lang="en-US" dirty="0"/>
             </a:br>
@@ -6196,10 +6434,9 @@
           <a:lstStyle/>
           <a:p>
             <a:r>
-              <a:rPr lang="en-US" dirty="0" smtClean="0"/>
+              <a:rPr lang="en-US" dirty="0"/>
               <a:t>Data Source</a:t>
             </a:r>
-            <a:endParaRPr lang="en-US" dirty="0"/>
           </a:p>
         </p:txBody>
       </p:sp>
@@ -6219,9 +6456,30 @@
           <a:lstStyle/>
           <a:p>
             <a:r>
-              <a:rPr lang="en-US" dirty="0" smtClean="0"/>
-              <a:t>Kaggle.com</a:t>
-            </a:r>
+              <a:rPr lang="en-US" dirty="0"/>
+              <a:t>https://</a:t>
+            </a:r>
+            <a:r>
+              <a:rPr lang="en-US" dirty="0" err="1"/>
+              <a:t>www.kaggle.com</a:t>
+            </a:r>
+            <a:r>
+              <a:rPr lang="en-US" dirty="0"/>
+              <a:t>/</a:t>
+            </a:r>
+            <a:r>
+              <a:rPr lang="en-US" dirty="0" err="1"/>
+              <a:t>mlg-ulb</a:t>
+            </a:r>
+            <a:r>
+              <a:rPr lang="en-US" dirty="0"/>
+              <a:t>/</a:t>
+            </a:r>
+            <a:r>
+              <a:rPr lang="en-US" dirty="0" err="1"/>
+              <a:t>creditcardfraud</a:t>
+            </a:r>
+            <a:endParaRPr lang="en-US" dirty="0"/>
           </a:p>
         </p:txBody>
       </p:sp>
@@ -6271,10 +6529,9 @@
           <a:lstStyle/>
           <a:p>
             <a:r>
-              <a:rPr lang="en-US" dirty="0" smtClean="0"/>
-              <a:t>Focus</a:t>
-            </a:r>
-            <a:endParaRPr lang="en-US" dirty="0"/>
+              <a:rPr lang="en-US" dirty="0"/>
+              <a:t>Demo</a:t>
+            </a:r>
           </a:p>
         </p:txBody>
       </p:sp>
@@ -6293,14 +6550,17 @@
           <a:bodyPr/>
           <a:lstStyle/>
           <a:p>
-            <a:endParaRPr lang="en-US" dirty="0"/>
+            <a:r>
+              <a:rPr lang="en-US" dirty="0"/>
+              <a:t>Interactive App</a:t>
+            </a:r>
           </a:p>
         </p:txBody>
       </p:sp>
     </p:spTree>
     <p:extLst>
       <p:ext uri="{BB962C8B-B14F-4D97-AF65-F5344CB8AC3E}">
-        <p14:creationId xmlns:p14="http://schemas.microsoft.com/office/powerpoint/2010/main" val="1237726168"/>
+        <p14:creationId xmlns:p14="http://schemas.microsoft.com/office/powerpoint/2010/main" val="3139636750"/>
       </p:ext>
     </p:extLst>
   </p:cSld>
@@ -6342,7 +6602,10 @@
           <a:bodyPr/>
           <a:lstStyle/>
           <a:p>
-            <a:endParaRPr lang="en-US" dirty="0"/>
+            <a:r>
+              <a:rPr lang="en-US" dirty="0"/>
+              <a:t>Unsupervised Learning</a:t>
+            </a:r>
           </a:p>
         </p:txBody>
       </p:sp>
@@ -6361,14 +6624,358 @@
           <a:bodyPr/>
           <a:lstStyle/>
           <a:p>
-            <a:endParaRPr lang="en-US"/>
+            <a:pPr marL="0" indent="0">
+              <a:buNone/>
+            </a:pPr>
+            <a:r>
+              <a:rPr lang="en-US" dirty="0"/>
+              <a:t>Massaged the data –  Created a function to generate anomalies</a:t>
+            </a:r>
+          </a:p>
+          <a:p>
+            <a:pPr marL="0" indent="0">
+              <a:buNone/>
+            </a:pPr>
+            <a:r>
+              <a:rPr lang="en-US" dirty="0"/>
+              <a:t>Dimensions , labels </a:t>
+            </a:r>
+            <a:r>
+              <a:rPr lang="en-US" dirty="0" err="1"/>
+              <a:t>etc</a:t>
+            </a:r>
+            <a:r>
+              <a:rPr lang="en-US" dirty="0"/>
+              <a:t> in the data set.</a:t>
+            </a:r>
+          </a:p>
+          <a:p>
+            <a:pPr marL="0" indent="0">
+              <a:buNone/>
+            </a:pPr>
+            <a:endParaRPr lang="en-US" dirty="0"/>
+          </a:p>
+          <a:p>
+            <a:pPr marL="0" indent="0">
+              <a:buNone/>
+            </a:pPr>
+            <a:r>
+              <a:rPr lang="en-US" dirty="0"/>
+              <a:t>&lt;Paste  data received from Nish&gt;</a:t>
+            </a:r>
+          </a:p>
+          <a:p>
+            <a:pPr marL="0" indent="0">
+              <a:buNone/>
+            </a:pPr>
+            <a:endParaRPr lang="en-US" dirty="0"/>
+          </a:p>
+          <a:p>
+            <a:pPr marL="0" indent="0">
+              <a:buNone/>
+            </a:pPr>
+            <a:r>
+              <a:rPr lang="en-US" dirty="0"/>
+              <a:t>New Models</a:t>
+            </a:r>
+          </a:p>
+          <a:p>
+            <a:pPr marL="0" indent="0">
+              <a:buNone/>
+            </a:pPr>
+            <a:endParaRPr lang="en-US" dirty="0"/>
+          </a:p>
+          <a:p>
+            <a:pPr marL="0" indent="0">
+              <a:buNone/>
+            </a:pPr>
+            <a:endParaRPr lang="en-US" dirty="0"/>
+          </a:p>
+          <a:p>
+            <a:pPr marL="0" indent="0">
+              <a:buNone/>
+            </a:pPr>
+            <a:endParaRPr lang="en-US" dirty="0"/>
+          </a:p>
+          <a:p>
+            <a:pPr marL="0" indent="0">
+              <a:buNone/>
+            </a:pPr>
+            <a:endParaRPr lang="en-US" dirty="0"/>
           </a:p>
         </p:txBody>
       </p:sp>
     </p:spTree>
     <p:extLst>
       <p:ext uri="{BB962C8B-B14F-4D97-AF65-F5344CB8AC3E}">
-        <p14:creationId xmlns:p14="http://schemas.microsoft.com/office/powerpoint/2010/main" val="3332505446"/>
+        <p14:creationId xmlns:p14="http://schemas.microsoft.com/office/powerpoint/2010/main" val="1237726168"/>
+      </p:ext>
+    </p:extLst>
+  </p:cSld>
+  <p:clrMapOvr>
+    <a:masterClrMapping/>
+  </p:clrMapOvr>
+</p:sld>
+</file>
+
+<file path=ppt/slides/slide8.xml><?xml version="1.0" encoding="utf-8"?>
+<p:sld xmlns:a="http://schemas.openxmlformats.org/drawingml/2006/main" xmlns:r="http://schemas.openxmlformats.org/officeDocument/2006/relationships" xmlns:p="http://schemas.openxmlformats.org/presentationml/2006/main">
+  <p:cSld>
+    <p:spTree>
+      <p:nvGrpSpPr>
+        <p:cNvPr id="1" name=""/>
+        <p:cNvGrpSpPr/>
+        <p:nvPr/>
+      </p:nvGrpSpPr>
+      <p:grpSpPr>
+        <a:xfrm>
+          <a:off x="0" y="0"/>
+          <a:ext cx="0" cy="0"/>
+          <a:chOff x="0" y="0"/>
+          <a:chExt cx="0" cy="0"/>
+        </a:xfrm>
+      </p:grpSpPr>
+      <p:sp>
+        <p:nvSpPr>
+          <p:cNvPr id="2" name="Title 1"/>
+          <p:cNvSpPr>
+            <a:spLocks noGrp="1"/>
+          </p:cNvSpPr>
+          <p:nvPr>
+            <p:ph type="title"/>
+          </p:nvPr>
+        </p:nvSpPr>
+        <p:spPr/>
+        <p:txBody>
+          <a:bodyPr/>
+          <a:lstStyle/>
+          <a:p>
+            <a:r>
+              <a:rPr lang="en-US" dirty="0"/>
+              <a:t>Unsupervised Learning</a:t>
+            </a:r>
+          </a:p>
+        </p:txBody>
+      </p:sp>
+      <p:sp>
+        <p:nvSpPr>
+          <p:cNvPr id="3" name="Content Placeholder 2"/>
+          <p:cNvSpPr>
+            <a:spLocks noGrp="1"/>
+          </p:cNvSpPr>
+          <p:nvPr>
+            <p:ph idx="1"/>
+          </p:nvPr>
+        </p:nvSpPr>
+        <p:spPr/>
+        <p:txBody>
+          <a:bodyPr/>
+          <a:lstStyle/>
+          <a:p>
+            <a:pPr marL="0" indent="0">
+              <a:buNone/>
+            </a:pPr>
+            <a:r>
+              <a:rPr lang="en-US" dirty="0"/>
+              <a:t>Massaged the data –  Created a function to generate anomalies</a:t>
+            </a:r>
+          </a:p>
+          <a:p>
+            <a:pPr marL="0" indent="0">
+              <a:buNone/>
+            </a:pPr>
+            <a:r>
+              <a:rPr lang="en-US" dirty="0"/>
+              <a:t>Dimensions , labels </a:t>
+            </a:r>
+            <a:r>
+              <a:rPr lang="en-US" dirty="0" err="1"/>
+              <a:t>etc</a:t>
+            </a:r>
+            <a:r>
+              <a:rPr lang="en-US" dirty="0"/>
+              <a:t> in the data set.</a:t>
+            </a:r>
+          </a:p>
+          <a:p>
+            <a:pPr marL="0" indent="0">
+              <a:buNone/>
+            </a:pPr>
+            <a:endParaRPr lang="en-US" dirty="0"/>
+          </a:p>
+          <a:p>
+            <a:pPr marL="0" indent="0">
+              <a:buNone/>
+            </a:pPr>
+            <a:r>
+              <a:rPr lang="en-US" dirty="0"/>
+              <a:t>&lt;Paste  data received from Nish&gt;</a:t>
+            </a:r>
+          </a:p>
+          <a:p>
+            <a:pPr marL="0" indent="0">
+              <a:buNone/>
+            </a:pPr>
+            <a:endParaRPr lang="en-US" dirty="0"/>
+          </a:p>
+          <a:p>
+            <a:pPr marL="0" indent="0">
+              <a:buNone/>
+            </a:pPr>
+            <a:r>
+              <a:rPr lang="en-US" dirty="0"/>
+              <a:t>New Models</a:t>
+            </a:r>
+          </a:p>
+          <a:p>
+            <a:pPr marL="0" indent="0">
+              <a:buNone/>
+            </a:pPr>
+            <a:endParaRPr lang="en-US" dirty="0"/>
+          </a:p>
+          <a:p>
+            <a:pPr marL="0" indent="0">
+              <a:buNone/>
+            </a:pPr>
+            <a:endParaRPr lang="en-US" dirty="0"/>
+          </a:p>
+          <a:p>
+            <a:pPr marL="0" indent="0">
+              <a:buNone/>
+            </a:pPr>
+            <a:endParaRPr lang="en-US" dirty="0"/>
+          </a:p>
+          <a:p>
+            <a:pPr marL="0" indent="0">
+              <a:buNone/>
+            </a:pPr>
+            <a:endParaRPr lang="en-US" dirty="0"/>
+          </a:p>
+        </p:txBody>
+      </p:sp>
+    </p:spTree>
+    <p:extLst>
+      <p:ext uri="{BB962C8B-B14F-4D97-AF65-F5344CB8AC3E}">
+        <p14:creationId xmlns:p14="http://schemas.microsoft.com/office/powerpoint/2010/main" val="2206545365"/>
+      </p:ext>
+    </p:extLst>
+  </p:cSld>
+  <p:clrMapOvr>
+    <a:masterClrMapping/>
+  </p:clrMapOvr>
+</p:sld>
+</file>
+
+<file path=ppt/slides/slide9.xml><?xml version="1.0" encoding="utf-8"?>
+<p:sld xmlns:a="http://schemas.openxmlformats.org/drawingml/2006/main" xmlns:r="http://schemas.openxmlformats.org/officeDocument/2006/relationships" xmlns:p="http://schemas.openxmlformats.org/presentationml/2006/main">
+  <p:cSld>
+    <p:spTree>
+      <p:nvGrpSpPr>
+        <p:cNvPr id="1" name=""/>
+        <p:cNvGrpSpPr/>
+        <p:nvPr/>
+      </p:nvGrpSpPr>
+      <p:grpSpPr>
+        <a:xfrm>
+          <a:off x="0" y="0"/>
+          <a:ext cx="0" cy="0"/>
+          <a:chOff x="0" y="0"/>
+          <a:chExt cx="0" cy="0"/>
+        </a:xfrm>
+      </p:grpSpPr>
+      <p:sp>
+        <p:nvSpPr>
+          <p:cNvPr id="2" name="Title 1">
+            <a:extLst>
+              <a:ext uri="{FF2B5EF4-FFF2-40B4-BE49-F238E27FC236}">
+                <a16:creationId xmlns:a16="http://schemas.microsoft.com/office/drawing/2014/main" id="{E25054A5-8599-D849-A841-108A1CF2FC62}"/>
+              </a:ext>
+            </a:extLst>
+          </p:cNvPr>
+          <p:cNvSpPr>
+            <a:spLocks noGrp="1"/>
+          </p:cNvSpPr>
+          <p:nvPr>
+            <p:ph type="title"/>
+          </p:nvPr>
+        </p:nvSpPr>
+        <p:spPr/>
+        <p:txBody>
+          <a:bodyPr/>
+          <a:lstStyle/>
+          <a:p>
+            <a:r>
+              <a:rPr lang="en-US" dirty="0"/>
+              <a:t>Supervised Learning</a:t>
+            </a:r>
+          </a:p>
+        </p:txBody>
+      </p:sp>
+      <p:sp>
+        <p:nvSpPr>
+          <p:cNvPr id="3" name="Content Placeholder 2">
+            <a:extLst>
+              <a:ext uri="{FF2B5EF4-FFF2-40B4-BE49-F238E27FC236}">
+                <a16:creationId xmlns:a16="http://schemas.microsoft.com/office/drawing/2014/main" id="{F4184509-1568-654E-968A-D1DBE14A8214}"/>
+              </a:ext>
+            </a:extLst>
+          </p:cNvPr>
+          <p:cNvSpPr>
+            <a:spLocks noGrp="1"/>
+          </p:cNvSpPr>
+          <p:nvPr>
+            <p:ph idx="1"/>
+          </p:nvPr>
+        </p:nvSpPr>
+        <p:spPr/>
+        <p:txBody>
+          <a:bodyPr/>
+          <a:lstStyle/>
+          <a:p>
+            <a:r>
+              <a:rPr lang="en-US" dirty="0"/>
+              <a:t>Anonymous data- PCA</a:t>
+            </a:r>
+          </a:p>
+          <a:p>
+            <a:endParaRPr lang="en-US" dirty="0"/>
+          </a:p>
+          <a:p>
+            <a:pPr marL="0" indent="0">
+              <a:buNone/>
+            </a:pPr>
+            <a:r>
+              <a:rPr lang="en-US" dirty="0"/>
+              <a:t>&lt;Paste  data received from Bill&gt;</a:t>
+            </a:r>
+          </a:p>
+          <a:p>
+            <a:pPr marL="0" indent="0">
+              <a:buNone/>
+            </a:pPr>
+            <a:endParaRPr lang="en-US" dirty="0"/>
+          </a:p>
+          <a:p>
+            <a:pPr marL="0" indent="0">
+              <a:buNone/>
+            </a:pPr>
+            <a:r>
+              <a:rPr lang="en-US" dirty="0"/>
+              <a:t>New Models</a:t>
+            </a:r>
+          </a:p>
+          <a:p>
+            <a:endParaRPr lang="en-US" dirty="0"/>
+          </a:p>
+          <a:p>
+            <a:endParaRPr lang="en-US" dirty="0"/>
+          </a:p>
+        </p:txBody>
+      </p:sp>
+    </p:spTree>
+    <p:extLst>
+      <p:ext uri="{BB962C8B-B14F-4D97-AF65-F5344CB8AC3E}">
+        <p14:creationId xmlns:p14="http://schemas.microsoft.com/office/powerpoint/2010/main" val="1562986955"/>
       </p:ext>
     </p:extLst>
   </p:cSld>

</xml_diff>

<commit_message>
Added unsupervised learning contents
</commit_message>
<xml_diff>
--- a/demo/Anomaly Detection.pptx
+++ b/demo/Anomaly Detection.pptx
@@ -11,12 +11,20 @@
     <p:sldId id="260" r:id="rId5"/>
     <p:sldId id="262" r:id="rId6"/>
     <p:sldId id="269" r:id="rId7"/>
-    <p:sldId id="263" r:id="rId8"/>
-    <p:sldId id="270" r:id="rId9"/>
-    <p:sldId id="267" r:id="rId10"/>
-    <p:sldId id="266" r:id="rId11"/>
-    <p:sldId id="265" r:id="rId12"/>
-    <p:sldId id="264" r:id="rId13"/>
+    <p:sldId id="270" r:id="rId8"/>
+    <p:sldId id="271" r:id="rId9"/>
+    <p:sldId id="272" r:id="rId10"/>
+    <p:sldId id="273" r:id="rId11"/>
+    <p:sldId id="274" r:id="rId12"/>
+    <p:sldId id="275" r:id="rId13"/>
+    <p:sldId id="276" r:id="rId14"/>
+    <p:sldId id="277" r:id="rId15"/>
+    <p:sldId id="278" r:id="rId16"/>
+    <p:sldId id="279" r:id="rId17"/>
+    <p:sldId id="267" r:id="rId18"/>
+    <p:sldId id="266" r:id="rId19"/>
+    <p:sldId id="265" r:id="rId20"/>
+    <p:sldId id="264" r:id="rId21"/>
   </p:sldIdLst>
   <p:sldSz cx="12192000" cy="6858000"/>
   <p:notesSz cx="6858000" cy="9144000"/>
@@ -319,7 +327,7 @@
           <a:p>
             <a:fld id="{ECD19FB2-3AAB-4D03-B13A-2960828C78E3}" type="datetimeFigureOut">
               <a:rPr lang="en-US" dirty="0"/>
-              <a:t>7/12/18</a:t>
+              <a:t>7/13/2018</a:t>
             </a:fld>
             <a:endParaRPr lang="en-US" dirty="0"/>
           </a:p>
@@ -596,7 +604,7 @@
           <a:p>
             <a:fld id="{1B80C674-7DFC-42FE-B9CD-82963CDB1557}" type="datetimeFigureOut">
               <a:rPr lang="en-US" dirty="0"/>
-              <a:t>7/12/18</a:t>
+              <a:t>7/13/2018</a:t>
             </a:fld>
             <a:endParaRPr lang="en-US" dirty="0"/>
           </a:p>
@@ -783,7 +791,7 @@
           <a:p>
             <a:fld id="{2076456F-F47D-4F25-8053-2A695DA0CA7D}" type="datetimeFigureOut">
               <a:rPr lang="en-US" dirty="0"/>
-              <a:t>7/12/18</a:t>
+              <a:t>7/13/2018</a:t>
             </a:fld>
             <a:endParaRPr lang="en-US" dirty="0"/>
           </a:p>
@@ -1039,7 +1047,7 @@
           <a:p>
             <a:fld id="{5D6C7379-69CC-4837-9905-BEBA22830C8A}" type="datetimeFigureOut">
               <a:rPr lang="en-US" dirty="0"/>
-              <a:t>7/12/18</a:t>
+              <a:t>7/13/2018</a:t>
             </a:fld>
             <a:endParaRPr lang="en-US" dirty="0"/>
           </a:p>
@@ -1460,7 +1468,7 @@
           <a:p>
             <a:fld id="{49EB8B7E-8AEE-4F10-BFEE-C999AD004D36}" type="datetimeFigureOut">
               <a:rPr lang="en-US" dirty="0"/>
-              <a:t>7/12/18</a:t>
+              <a:t>7/13/2018</a:t>
             </a:fld>
             <a:endParaRPr lang="en-US" dirty="0"/>
           </a:p>
@@ -2001,7 +2009,7 @@
           <a:p>
             <a:fld id="{8668F3F9-58BC-440B-B37B-805B9055EF92}" type="datetimeFigureOut">
               <a:rPr lang="en-US" dirty="0"/>
-              <a:t>7/12/18</a:t>
+              <a:t>7/13/2018</a:t>
             </a:fld>
             <a:endParaRPr lang="en-US" dirty="0"/>
           </a:p>
@@ -2827,7 +2835,7 @@
           <a:p>
             <a:fld id="{0D5A53AF-48EA-489D-8260-9DCAB666386A}" type="datetimeFigureOut">
               <a:rPr lang="en-US" dirty="0"/>
-              <a:t>7/12/18</a:t>
+              <a:t>7/13/2018</a:t>
             </a:fld>
             <a:endParaRPr lang="en-US" dirty="0"/>
           </a:p>
@@ -2992,7 +3000,7 @@
           <a:p>
             <a:fld id="{0DED02AE-B9A4-47BD-AF8E-97E16144138B}" type="datetimeFigureOut">
               <a:rPr lang="en-US" dirty="0"/>
-              <a:t>7/12/18</a:t>
+              <a:t>7/13/2018</a:t>
             </a:fld>
             <a:endParaRPr lang="en-US" dirty="0"/>
           </a:p>
@@ -3167,7 +3175,7 @@
           <a:p>
             <a:fld id="{CF0FD78B-DB02-4362-BCDC-98A55456977C}" type="datetimeFigureOut">
               <a:rPr lang="en-US" dirty="0"/>
-              <a:t>7/12/18</a:t>
+              <a:t>7/13/2018</a:t>
             </a:fld>
             <a:endParaRPr lang="en-US" dirty="0"/>
           </a:p>
@@ -3332,7 +3340,7 @@
           <a:p>
             <a:fld id="{99916976-5D93-46E4-A98A-FAD63E4D0EA8}" type="datetimeFigureOut">
               <a:rPr lang="en-US" dirty="0"/>
-              <a:t>7/12/18</a:t>
+              <a:t>7/13/2018</a:t>
             </a:fld>
             <a:endParaRPr lang="en-US" dirty="0"/>
           </a:p>
@@ -3584,7 +3592,7 @@
           <a:p>
             <a:fld id="{0F39F4F5-F4D2-4D2A-AB60-88D37ADCB869}" type="datetimeFigureOut">
               <a:rPr lang="en-US" dirty="0"/>
-              <a:t>7/12/18</a:t>
+              <a:t>7/13/2018</a:t>
             </a:fld>
             <a:endParaRPr lang="en-US" dirty="0"/>
           </a:p>
@@ -3811,7 +3819,7 @@
           <a:p>
             <a:fld id="{D23BC6CE-6D1E-47E5-8859-F31AC5380EB2}" type="datetimeFigureOut">
               <a:rPr lang="en-US" dirty="0"/>
-              <a:t>7/12/18</a:t>
+              <a:t>7/13/2018</a:t>
             </a:fld>
             <a:endParaRPr lang="en-US" dirty="0"/>
           </a:p>
@@ -4199,7 +4207,7 @@
           <a:p>
             <a:fld id="{B1B4E7C4-4DA4-404D-9965-B13F2DD7D8BF}" type="datetimeFigureOut">
               <a:rPr lang="en-US" dirty="0"/>
-              <a:t>7/12/18</a:t>
+              <a:t>7/13/2018</a:t>
             </a:fld>
             <a:endParaRPr lang="en-US" dirty="0"/>
           </a:p>
@@ -4312,7 +4320,7 @@
           <a:p>
             <a:fld id="{476FB7AA-4A53-424F-AD41-70827B6504BA}" type="datetimeFigureOut">
               <a:rPr lang="en-US" dirty="0"/>
-              <a:t>7/12/18</a:t>
+              <a:t>7/13/2018</a:t>
             </a:fld>
             <a:endParaRPr lang="en-US" dirty="0"/>
           </a:p>
@@ -4402,7 +4410,7 @@
           <a:p>
             <a:fld id="{E7884882-FB12-4BC8-9960-9AD8104D7FAE}" type="datetimeFigureOut">
               <a:rPr lang="en-US" dirty="0"/>
-              <a:t>7/12/18</a:t>
+              <a:t>7/13/2018</a:t>
             </a:fld>
             <a:endParaRPr lang="en-US" dirty="0"/>
           </a:p>
@@ -4670,7 +4678,7 @@
           <a:p>
             <a:fld id="{F7D1BD23-6E54-4D9D-AD88-A2813C73CC25}" type="datetimeFigureOut">
               <a:rPr lang="en-US" dirty="0"/>
-              <a:t>7/12/18</a:t>
+              <a:t>7/13/2018</a:t>
             </a:fld>
             <a:endParaRPr lang="en-US" dirty="0"/>
           </a:p>
@@ -4946,7 +4954,7 @@
           <a:p>
             <a:fld id="{1471A834-4F3C-4AF9-9C74-05EC35A0F292}" type="datetimeFigureOut">
               <a:rPr lang="en-US" dirty="0"/>
-              <a:t>7/12/18</a:t>
+              <a:t>7/13/2018</a:t>
             </a:fld>
             <a:endParaRPr lang="en-US" dirty="0"/>
           </a:p>
@@ -5181,7 +5189,7 @@
           <a:p>
             <a:fld id="{51CF1133-3259-4C45-BABA-5B62D9C6F78D}" type="datetimeFigureOut">
               <a:rPr lang="en-US" dirty="0"/>
-              <a:t>7/12/18</a:t>
+              <a:t>7/13/2018</a:t>
             </a:fld>
             <a:endParaRPr lang="en-US" dirty="0"/>
           </a:p>
@@ -5830,6 +5838,792 @@
           <p:cNvPr id="2" name="Title 1">
             <a:extLst>
               <a:ext uri="{FF2B5EF4-FFF2-40B4-BE49-F238E27FC236}">
+                <a16:creationId xmlns:a16="http://schemas.microsoft.com/office/drawing/2014/main" id="{B71796E9-CE31-4160-B0F1-EED31ADB3659}"/>
+              </a:ext>
+            </a:extLst>
+          </p:cNvPr>
+          <p:cNvSpPr>
+            <a:spLocks noGrp="1"/>
+          </p:cNvSpPr>
+          <p:nvPr>
+            <p:ph type="title"/>
+          </p:nvPr>
+        </p:nvSpPr>
+        <p:spPr/>
+        <p:txBody>
+          <a:bodyPr/>
+          <a:lstStyle/>
+          <a:p>
+            <a:endParaRPr lang="en-US"/>
+          </a:p>
+        </p:txBody>
+      </p:sp>
+      <p:pic>
+        <p:nvPicPr>
+          <p:cNvPr id="4" name="Picture 3">
+            <a:extLst>
+              <a:ext uri="{FF2B5EF4-FFF2-40B4-BE49-F238E27FC236}">
+                <a16:creationId xmlns:a16="http://schemas.microsoft.com/office/drawing/2014/main" id="{50327D20-708C-4667-A6DD-884E6D0885AF}"/>
+              </a:ext>
+            </a:extLst>
+          </p:cNvPr>
+          <p:cNvPicPr/>
+          <p:nvPr/>
+        </p:nvPicPr>
+        <p:blipFill>
+          <a:blip r:embed="rId2">
+            <a:extLst>
+              <a:ext uri="{28A0092B-C50C-407E-A947-70E740481C1C}">
+                <a14:useLocalDpi xmlns:a14="http://schemas.microsoft.com/office/drawing/2010/main" val="0"/>
+              </a:ext>
+            </a:extLst>
+          </a:blip>
+          <a:srcRect/>
+          <a:stretch>
+            <a:fillRect/>
+          </a:stretch>
+        </p:blipFill>
+        <p:spPr bwMode="auto">
+          <a:xfrm>
+            <a:off x="2638742" y="2118149"/>
+            <a:ext cx="6674591" cy="4374726"/>
+          </a:xfrm>
+          <a:prstGeom prst="rect">
+            <a:avLst/>
+          </a:prstGeom>
+          <a:noFill/>
+          <a:ln>
+            <a:noFill/>
+          </a:ln>
+        </p:spPr>
+      </p:pic>
+    </p:spTree>
+    <p:extLst>
+      <p:ext uri="{BB962C8B-B14F-4D97-AF65-F5344CB8AC3E}">
+        <p14:creationId xmlns:p14="http://schemas.microsoft.com/office/powerpoint/2010/main" val="3938789076"/>
+      </p:ext>
+    </p:extLst>
+  </p:cSld>
+  <p:clrMapOvr>
+    <a:masterClrMapping/>
+  </p:clrMapOvr>
+</p:sld>
+</file>
+
+<file path=ppt/slides/slide11.xml><?xml version="1.0" encoding="utf-8"?>
+<p:sld xmlns:a="http://schemas.openxmlformats.org/drawingml/2006/main" xmlns:r="http://schemas.openxmlformats.org/officeDocument/2006/relationships" xmlns:p="http://schemas.openxmlformats.org/presentationml/2006/main">
+  <p:cSld>
+    <p:spTree>
+      <p:nvGrpSpPr>
+        <p:cNvPr id="1" name=""/>
+        <p:cNvGrpSpPr/>
+        <p:nvPr/>
+      </p:nvGrpSpPr>
+      <p:grpSpPr>
+        <a:xfrm>
+          <a:off x="0" y="0"/>
+          <a:ext cx="0" cy="0"/>
+          <a:chOff x="0" y="0"/>
+          <a:chExt cx="0" cy="0"/>
+        </a:xfrm>
+      </p:grpSpPr>
+      <p:sp>
+        <p:nvSpPr>
+          <p:cNvPr id="2" name="Title 1">
+            <a:extLst>
+              <a:ext uri="{FF2B5EF4-FFF2-40B4-BE49-F238E27FC236}">
+                <a16:creationId xmlns:a16="http://schemas.microsoft.com/office/drawing/2014/main" id="{3E97418D-167F-4394-8B22-2F38629E06B6}"/>
+              </a:ext>
+            </a:extLst>
+          </p:cNvPr>
+          <p:cNvSpPr>
+            <a:spLocks noGrp="1"/>
+          </p:cNvSpPr>
+          <p:nvPr>
+            <p:ph type="title"/>
+          </p:nvPr>
+        </p:nvSpPr>
+        <p:spPr/>
+        <p:txBody>
+          <a:bodyPr/>
+          <a:lstStyle/>
+          <a:p>
+            <a:endParaRPr lang="en-US"/>
+          </a:p>
+        </p:txBody>
+      </p:sp>
+      <p:pic>
+        <p:nvPicPr>
+          <p:cNvPr id="4" name="Picture 3">
+            <a:extLst>
+              <a:ext uri="{FF2B5EF4-FFF2-40B4-BE49-F238E27FC236}">
+                <a16:creationId xmlns:a16="http://schemas.microsoft.com/office/drawing/2014/main" id="{A5F7F0EA-A3A7-4D22-BC49-EBA00DCAB96E}"/>
+              </a:ext>
+            </a:extLst>
+          </p:cNvPr>
+          <p:cNvPicPr/>
+          <p:nvPr/>
+        </p:nvPicPr>
+        <p:blipFill>
+          <a:blip r:embed="rId2">
+            <a:extLst>
+              <a:ext uri="{28A0092B-C50C-407E-A947-70E740481C1C}">
+                <a14:useLocalDpi xmlns:a14="http://schemas.microsoft.com/office/drawing/2010/main" val="0"/>
+              </a:ext>
+            </a:extLst>
+          </a:blip>
+          <a:srcRect/>
+          <a:stretch>
+            <a:fillRect/>
+          </a:stretch>
+        </p:blipFill>
+        <p:spPr bwMode="auto">
+          <a:xfrm>
+            <a:off x="3891915" y="1964267"/>
+            <a:ext cx="4066752" cy="4755938"/>
+          </a:xfrm>
+          <a:prstGeom prst="rect">
+            <a:avLst/>
+          </a:prstGeom>
+          <a:noFill/>
+          <a:ln>
+            <a:noFill/>
+          </a:ln>
+        </p:spPr>
+      </p:pic>
+    </p:spTree>
+    <p:extLst>
+      <p:ext uri="{BB962C8B-B14F-4D97-AF65-F5344CB8AC3E}">
+        <p14:creationId xmlns:p14="http://schemas.microsoft.com/office/powerpoint/2010/main" val="3100360092"/>
+      </p:ext>
+    </p:extLst>
+  </p:cSld>
+  <p:clrMapOvr>
+    <a:masterClrMapping/>
+  </p:clrMapOvr>
+</p:sld>
+</file>
+
+<file path=ppt/slides/slide12.xml><?xml version="1.0" encoding="utf-8"?>
+<p:sld xmlns:a="http://schemas.openxmlformats.org/drawingml/2006/main" xmlns:r="http://schemas.openxmlformats.org/officeDocument/2006/relationships" xmlns:p="http://schemas.openxmlformats.org/presentationml/2006/main">
+  <p:cSld>
+    <p:spTree>
+      <p:nvGrpSpPr>
+        <p:cNvPr id="1" name=""/>
+        <p:cNvGrpSpPr/>
+        <p:nvPr/>
+      </p:nvGrpSpPr>
+      <p:grpSpPr>
+        <a:xfrm>
+          <a:off x="0" y="0"/>
+          <a:ext cx="0" cy="0"/>
+          <a:chOff x="0" y="0"/>
+          <a:chExt cx="0" cy="0"/>
+        </a:xfrm>
+      </p:grpSpPr>
+      <p:sp>
+        <p:nvSpPr>
+          <p:cNvPr id="2" name="Title 1">
+            <a:extLst>
+              <a:ext uri="{FF2B5EF4-FFF2-40B4-BE49-F238E27FC236}">
+                <a16:creationId xmlns:a16="http://schemas.microsoft.com/office/drawing/2014/main" id="{7528F1D4-E7A2-482E-8982-18D290466D57}"/>
+              </a:ext>
+            </a:extLst>
+          </p:cNvPr>
+          <p:cNvSpPr>
+            <a:spLocks noGrp="1"/>
+          </p:cNvSpPr>
+          <p:nvPr>
+            <p:ph type="title"/>
+          </p:nvPr>
+        </p:nvSpPr>
+        <p:spPr/>
+        <p:txBody>
+          <a:bodyPr/>
+          <a:lstStyle/>
+          <a:p>
+            <a:endParaRPr lang="en-US"/>
+          </a:p>
+        </p:txBody>
+      </p:sp>
+      <p:pic>
+        <p:nvPicPr>
+          <p:cNvPr id="4" name="Picture 3">
+            <a:extLst>
+              <a:ext uri="{FF2B5EF4-FFF2-40B4-BE49-F238E27FC236}">
+                <a16:creationId xmlns:a16="http://schemas.microsoft.com/office/drawing/2014/main" id="{8D7DBB16-CF28-4B69-A162-5B0C2017CF86}"/>
+              </a:ext>
+            </a:extLst>
+          </p:cNvPr>
+          <p:cNvPicPr/>
+          <p:nvPr/>
+        </p:nvPicPr>
+        <p:blipFill>
+          <a:blip r:embed="rId2">
+            <a:extLst>
+              <a:ext uri="{28A0092B-C50C-407E-A947-70E740481C1C}">
+                <a14:useLocalDpi xmlns:a14="http://schemas.microsoft.com/office/drawing/2010/main" val="0"/>
+              </a:ext>
+            </a:extLst>
+          </a:blip>
+          <a:srcRect/>
+          <a:stretch>
+            <a:fillRect/>
+          </a:stretch>
+        </p:blipFill>
+        <p:spPr bwMode="auto">
+          <a:xfrm>
+            <a:off x="2658532" y="2367492"/>
+            <a:ext cx="6688667" cy="3982508"/>
+          </a:xfrm>
+          <a:prstGeom prst="rect">
+            <a:avLst/>
+          </a:prstGeom>
+          <a:noFill/>
+          <a:ln>
+            <a:noFill/>
+          </a:ln>
+        </p:spPr>
+      </p:pic>
+    </p:spTree>
+    <p:extLst>
+      <p:ext uri="{BB962C8B-B14F-4D97-AF65-F5344CB8AC3E}">
+        <p14:creationId xmlns:p14="http://schemas.microsoft.com/office/powerpoint/2010/main" val="3894267949"/>
+      </p:ext>
+    </p:extLst>
+  </p:cSld>
+  <p:clrMapOvr>
+    <a:masterClrMapping/>
+  </p:clrMapOvr>
+</p:sld>
+</file>
+
+<file path=ppt/slides/slide13.xml><?xml version="1.0" encoding="utf-8"?>
+<p:sld xmlns:a="http://schemas.openxmlformats.org/drawingml/2006/main" xmlns:r="http://schemas.openxmlformats.org/officeDocument/2006/relationships" xmlns:p="http://schemas.openxmlformats.org/presentationml/2006/main">
+  <p:cSld>
+    <p:spTree>
+      <p:nvGrpSpPr>
+        <p:cNvPr id="1" name=""/>
+        <p:cNvGrpSpPr/>
+        <p:nvPr/>
+      </p:nvGrpSpPr>
+      <p:grpSpPr>
+        <a:xfrm>
+          <a:off x="0" y="0"/>
+          <a:ext cx="0" cy="0"/>
+          <a:chOff x="0" y="0"/>
+          <a:chExt cx="0" cy="0"/>
+        </a:xfrm>
+      </p:grpSpPr>
+      <p:sp>
+        <p:nvSpPr>
+          <p:cNvPr id="2" name="Title 1">
+            <a:extLst>
+              <a:ext uri="{FF2B5EF4-FFF2-40B4-BE49-F238E27FC236}">
+                <a16:creationId xmlns:a16="http://schemas.microsoft.com/office/drawing/2014/main" id="{AF3E7144-B443-49D4-8058-9B5FE42A3A10}"/>
+              </a:ext>
+            </a:extLst>
+          </p:cNvPr>
+          <p:cNvSpPr>
+            <a:spLocks noGrp="1"/>
+          </p:cNvSpPr>
+          <p:nvPr>
+            <p:ph type="title"/>
+          </p:nvPr>
+        </p:nvSpPr>
+        <p:spPr/>
+        <p:txBody>
+          <a:bodyPr/>
+          <a:lstStyle/>
+          <a:p>
+            <a:endParaRPr lang="en-US"/>
+          </a:p>
+        </p:txBody>
+      </p:sp>
+      <p:pic>
+        <p:nvPicPr>
+          <p:cNvPr id="4" name="Picture 3">
+            <a:extLst>
+              <a:ext uri="{FF2B5EF4-FFF2-40B4-BE49-F238E27FC236}">
+                <a16:creationId xmlns:a16="http://schemas.microsoft.com/office/drawing/2014/main" id="{43AA9DD8-A927-4401-89E2-1BBF72D38E7E}"/>
+              </a:ext>
+            </a:extLst>
+          </p:cNvPr>
+          <p:cNvPicPr/>
+          <p:nvPr/>
+        </p:nvPicPr>
+        <p:blipFill>
+          <a:blip r:embed="rId2">
+            <a:extLst>
+              <a:ext uri="{28A0092B-C50C-407E-A947-70E740481C1C}">
+                <a14:useLocalDpi xmlns:a14="http://schemas.microsoft.com/office/drawing/2010/main" val="0"/>
+              </a:ext>
+            </a:extLst>
+          </a:blip>
+          <a:srcRect/>
+          <a:stretch>
+            <a:fillRect/>
+          </a:stretch>
+        </p:blipFill>
+        <p:spPr bwMode="auto">
+          <a:xfrm>
+            <a:off x="2542116" y="2202497"/>
+            <a:ext cx="6517217" cy="3893503"/>
+          </a:xfrm>
+          <a:prstGeom prst="rect">
+            <a:avLst/>
+          </a:prstGeom>
+          <a:noFill/>
+          <a:ln>
+            <a:noFill/>
+          </a:ln>
+        </p:spPr>
+      </p:pic>
+    </p:spTree>
+    <p:extLst>
+      <p:ext uri="{BB962C8B-B14F-4D97-AF65-F5344CB8AC3E}">
+        <p14:creationId xmlns:p14="http://schemas.microsoft.com/office/powerpoint/2010/main" val="3719222156"/>
+      </p:ext>
+    </p:extLst>
+  </p:cSld>
+  <p:clrMapOvr>
+    <a:masterClrMapping/>
+  </p:clrMapOvr>
+</p:sld>
+</file>
+
+<file path=ppt/slides/slide14.xml><?xml version="1.0" encoding="utf-8"?>
+<p:sld xmlns:a="http://schemas.openxmlformats.org/drawingml/2006/main" xmlns:r="http://schemas.openxmlformats.org/officeDocument/2006/relationships" xmlns:p="http://schemas.openxmlformats.org/presentationml/2006/main">
+  <p:cSld>
+    <p:spTree>
+      <p:nvGrpSpPr>
+        <p:cNvPr id="1" name=""/>
+        <p:cNvGrpSpPr/>
+        <p:nvPr/>
+      </p:nvGrpSpPr>
+      <p:grpSpPr>
+        <a:xfrm>
+          <a:off x="0" y="0"/>
+          <a:ext cx="0" cy="0"/>
+          <a:chOff x="0" y="0"/>
+          <a:chExt cx="0" cy="0"/>
+        </a:xfrm>
+      </p:grpSpPr>
+      <p:sp>
+        <p:nvSpPr>
+          <p:cNvPr id="2" name="Title 1">
+            <a:extLst>
+              <a:ext uri="{FF2B5EF4-FFF2-40B4-BE49-F238E27FC236}">
+                <a16:creationId xmlns:a16="http://schemas.microsoft.com/office/drawing/2014/main" id="{57F1B00E-4F3C-4FD6-B556-C4978AB67CF6}"/>
+              </a:ext>
+            </a:extLst>
+          </p:cNvPr>
+          <p:cNvSpPr>
+            <a:spLocks noGrp="1"/>
+          </p:cNvSpPr>
+          <p:nvPr>
+            <p:ph type="title"/>
+          </p:nvPr>
+        </p:nvSpPr>
+        <p:spPr/>
+        <p:txBody>
+          <a:bodyPr/>
+          <a:lstStyle/>
+          <a:p>
+            <a:r>
+              <a:rPr lang="en-US" dirty="0"/>
+              <a:t>Creating testing data</a:t>
+            </a:r>
+          </a:p>
+        </p:txBody>
+      </p:sp>
+      <p:pic>
+        <p:nvPicPr>
+          <p:cNvPr id="4" name="Picture 3">
+            <a:extLst>
+              <a:ext uri="{FF2B5EF4-FFF2-40B4-BE49-F238E27FC236}">
+                <a16:creationId xmlns:a16="http://schemas.microsoft.com/office/drawing/2014/main" id="{B4AFC511-63E0-4E9B-A9BF-A724D73194A0}"/>
+              </a:ext>
+            </a:extLst>
+          </p:cNvPr>
+          <p:cNvPicPr/>
+          <p:nvPr/>
+        </p:nvPicPr>
+        <p:blipFill>
+          <a:blip r:embed="rId2">
+            <a:extLst>
+              <a:ext uri="{28A0092B-C50C-407E-A947-70E740481C1C}">
+                <a14:useLocalDpi xmlns:a14="http://schemas.microsoft.com/office/drawing/2010/main" val="0"/>
+              </a:ext>
+            </a:extLst>
+          </a:blip>
+          <a:srcRect/>
+          <a:stretch>
+            <a:fillRect/>
+          </a:stretch>
+        </p:blipFill>
+        <p:spPr bwMode="auto">
+          <a:xfrm>
+            <a:off x="3228975" y="2294043"/>
+            <a:ext cx="5734050" cy="3726180"/>
+          </a:xfrm>
+          <a:prstGeom prst="rect">
+            <a:avLst/>
+          </a:prstGeom>
+          <a:noFill/>
+          <a:ln>
+            <a:noFill/>
+          </a:ln>
+        </p:spPr>
+      </p:pic>
+    </p:spTree>
+    <p:extLst>
+      <p:ext uri="{BB962C8B-B14F-4D97-AF65-F5344CB8AC3E}">
+        <p14:creationId xmlns:p14="http://schemas.microsoft.com/office/powerpoint/2010/main" val="1042957157"/>
+      </p:ext>
+    </p:extLst>
+  </p:cSld>
+  <p:clrMapOvr>
+    <a:masterClrMapping/>
+  </p:clrMapOvr>
+</p:sld>
+</file>
+
+<file path=ppt/slides/slide15.xml><?xml version="1.0" encoding="utf-8"?>
+<p:sld xmlns:a="http://schemas.openxmlformats.org/drawingml/2006/main" xmlns:r="http://schemas.openxmlformats.org/officeDocument/2006/relationships" xmlns:p="http://schemas.openxmlformats.org/presentationml/2006/main">
+  <p:cSld>
+    <p:spTree>
+      <p:nvGrpSpPr>
+        <p:cNvPr id="1" name=""/>
+        <p:cNvGrpSpPr/>
+        <p:nvPr/>
+      </p:nvGrpSpPr>
+      <p:grpSpPr>
+        <a:xfrm>
+          <a:off x="0" y="0"/>
+          <a:ext cx="0" cy="0"/>
+          <a:chOff x="0" y="0"/>
+          <a:chExt cx="0" cy="0"/>
+        </a:xfrm>
+      </p:grpSpPr>
+      <p:sp>
+        <p:nvSpPr>
+          <p:cNvPr id="2" name="Title 1">
+            <a:extLst>
+              <a:ext uri="{FF2B5EF4-FFF2-40B4-BE49-F238E27FC236}">
+                <a16:creationId xmlns:a16="http://schemas.microsoft.com/office/drawing/2014/main" id="{8C1AA83B-8F6E-4C7B-AE92-44CF0506D726}"/>
+              </a:ext>
+            </a:extLst>
+          </p:cNvPr>
+          <p:cNvSpPr>
+            <a:spLocks noGrp="1"/>
+          </p:cNvSpPr>
+          <p:nvPr>
+            <p:ph type="title"/>
+          </p:nvPr>
+        </p:nvSpPr>
+        <p:spPr/>
+        <p:txBody>
+          <a:bodyPr>
+            <a:normAutofit fontScale="90000"/>
+          </a:bodyPr>
+          <a:lstStyle/>
+          <a:p>
+            <a:r>
+              <a:rPr lang="en-US" dirty="0"/>
+              <a:t>Detection Outliers in Univariate space</a:t>
+            </a:r>
+          </a:p>
+        </p:txBody>
+      </p:sp>
+      <p:sp>
+        <p:nvSpPr>
+          <p:cNvPr id="3" name="Content Placeholder 2">
+            <a:extLst>
+              <a:ext uri="{FF2B5EF4-FFF2-40B4-BE49-F238E27FC236}">
+                <a16:creationId xmlns:a16="http://schemas.microsoft.com/office/drawing/2014/main" id="{43D612EA-C7EB-49B7-9A26-1BDF2E566375}"/>
+              </a:ext>
+            </a:extLst>
+          </p:cNvPr>
+          <p:cNvSpPr>
+            <a:spLocks noGrp="1"/>
+          </p:cNvSpPr>
+          <p:nvPr>
+            <p:ph idx="1"/>
+          </p:nvPr>
+        </p:nvSpPr>
+        <p:spPr/>
+        <p:txBody>
+          <a:bodyPr/>
+          <a:lstStyle/>
+          <a:p>
+            <a:r>
+              <a:rPr lang="en-US" dirty="0"/>
+              <a:t>Three Sigma Rule</a:t>
+            </a:r>
+          </a:p>
+          <a:p>
+            <a:r>
+              <a:rPr lang="en-US" dirty="0"/>
+              <a:t>Median absolute deviation Rule</a:t>
+            </a:r>
+          </a:p>
+          <a:p>
+            <a:r>
+              <a:rPr lang="en-US" dirty="0"/>
+              <a:t>Boxplot Rule</a:t>
+            </a:r>
+          </a:p>
+        </p:txBody>
+      </p:sp>
+    </p:spTree>
+    <p:extLst>
+      <p:ext uri="{BB962C8B-B14F-4D97-AF65-F5344CB8AC3E}">
+        <p14:creationId xmlns:p14="http://schemas.microsoft.com/office/powerpoint/2010/main" val="2724878585"/>
+      </p:ext>
+    </p:extLst>
+  </p:cSld>
+  <p:clrMapOvr>
+    <a:masterClrMapping/>
+  </p:clrMapOvr>
+</p:sld>
+</file>
+
+<file path=ppt/slides/slide16.xml><?xml version="1.0" encoding="utf-8"?>
+<p:sld xmlns:a="http://schemas.openxmlformats.org/drawingml/2006/main" xmlns:r="http://schemas.openxmlformats.org/officeDocument/2006/relationships" xmlns:p="http://schemas.openxmlformats.org/presentationml/2006/main">
+  <p:cSld>
+    <p:spTree>
+      <p:nvGrpSpPr>
+        <p:cNvPr id="1" name=""/>
+        <p:cNvGrpSpPr/>
+        <p:nvPr/>
+      </p:nvGrpSpPr>
+      <p:grpSpPr>
+        <a:xfrm>
+          <a:off x="0" y="0"/>
+          <a:ext cx="0" cy="0"/>
+          <a:chOff x="0" y="0"/>
+          <a:chExt cx="0" cy="0"/>
+        </a:xfrm>
+      </p:grpSpPr>
+      <p:sp>
+        <p:nvSpPr>
+          <p:cNvPr id="2" name="Title 1">
+            <a:extLst>
+              <a:ext uri="{FF2B5EF4-FFF2-40B4-BE49-F238E27FC236}">
+                <a16:creationId xmlns:a16="http://schemas.microsoft.com/office/drawing/2014/main" id="{857D3DC0-38B6-4236-B869-05EE70E6D4C8}"/>
+              </a:ext>
+            </a:extLst>
+          </p:cNvPr>
+          <p:cNvSpPr>
+            <a:spLocks noGrp="1"/>
+          </p:cNvSpPr>
+          <p:nvPr>
+            <p:ph type="title"/>
+          </p:nvPr>
+        </p:nvSpPr>
+        <p:spPr/>
+        <p:txBody>
+          <a:bodyPr>
+            <a:normAutofit fontScale="90000"/>
+          </a:bodyPr>
+          <a:lstStyle/>
+          <a:p>
+            <a:r>
+              <a:rPr lang="en-US" dirty="0"/>
+              <a:t>Detection Outliers in Multivariate space</a:t>
+            </a:r>
+          </a:p>
+        </p:txBody>
+      </p:sp>
+      <p:sp>
+        <p:nvSpPr>
+          <p:cNvPr id="3" name="Content Placeholder 2">
+            <a:extLst>
+              <a:ext uri="{FF2B5EF4-FFF2-40B4-BE49-F238E27FC236}">
+                <a16:creationId xmlns:a16="http://schemas.microsoft.com/office/drawing/2014/main" id="{C2765026-088C-49CA-A87B-01099DE2ECA7}"/>
+              </a:ext>
+            </a:extLst>
+          </p:cNvPr>
+          <p:cNvSpPr>
+            <a:spLocks noGrp="1"/>
+          </p:cNvSpPr>
+          <p:nvPr>
+            <p:ph idx="1"/>
+          </p:nvPr>
+        </p:nvSpPr>
+        <p:spPr/>
+        <p:txBody>
+          <a:bodyPr/>
+          <a:lstStyle/>
+          <a:p>
+            <a:r>
+              <a:rPr lang="en-US" dirty="0"/>
+              <a:t>LOF: Identifying Density-Based Local Outliers</a:t>
+            </a:r>
+          </a:p>
+          <a:p>
+            <a:r>
+              <a:rPr lang="en-US" dirty="0"/>
+              <a:t>Angle-Based Outlier Detection in High-dimensional Data</a:t>
+            </a:r>
+          </a:p>
+        </p:txBody>
+      </p:sp>
+    </p:spTree>
+    <p:extLst>
+      <p:ext uri="{BB962C8B-B14F-4D97-AF65-F5344CB8AC3E}">
+        <p14:creationId xmlns:p14="http://schemas.microsoft.com/office/powerpoint/2010/main" val="3147621224"/>
+      </p:ext>
+    </p:extLst>
+  </p:cSld>
+  <p:clrMapOvr>
+    <a:masterClrMapping/>
+  </p:clrMapOvr>
+</p:sld>
+</file>
+
+<file path=ppt/slides/slide17.xml><?xml version="1.0" encoding="utf-8"?>
+<p:sld xmlns:a="http://schemas.openxmlformats.org/drawingml/2006/main" xmlns:r="http://schemas.openxmlformats.org/officeDocument/2006/relationships" xmlns:p="http://schemas.openxmlformats.org/presentationml/2006/main">
+  <p:cSld>
+    <p:spTree>
+      <p:nvGrpSpPr>
+        <p:cNvPr id="1" name=""/>
+        <p:cNvGrpSpPr/>
+        <p:nvPr/>
+      </p:nvGrpSpPr>
+      <p:grpSpPr>
+        <a:xfrm>
+          <a:off x="0" y="0"/>
+          <a:ext cx="0" cy="0"/>
+          <a:chOff x="0" y="0"/>
+          <a:chExt cx="0" cy="0"/>
+        </a:xfrm>
+      </p:grpSpPr>
+      <p:sp>
+        <p:nvSpPr>
+          <p:cNvPr id="2" name="Title 1">
+            <a:extLst>
+              <a:ext uri="{FF2B5EF4-FFF2-40B4-BE49-F238E27FC236}">
+                <a16:creationId xmlns:a16="http://schemas.microsoft.com/office/drawing/2014/main" id="{E25054A5-8599-D849-A841-108A1CF2FC62}"/>
+              </a:ext>
+            </a:extLst>
+          </p:cNvPr>
+          <p:cNvSpPr>
+            <a:spLocks noGrp="1"/>
+          </p:cNvSpPr>
+          <p:nvPr>
+            <p:ph type="title"/>
+          </p:nvPr>
+        </p:nvSpPr>
+        <p:spPr/>
+        <p:txBody>
+          <a:bodyPr/>
+          <a:lstStyle/>
+          <a:p>
+            <a:r>
+              <a:rPr lang="en-US" dirty="0"/>
+              <a:t>Supervised Learning</a:t>
+            </a:r>
+          </a:p>
+        </p:txBody>
+      </p:sp>
+      <p:sp>
+        <p:nvSpPr>
+          <p:cNvPr id="3" name="Content Placeholder 2">
+            <a:extLst>
+              <a:ext uri="{FF2B5EF4-FFF2-40B4-BE49-F238E27FC236}">
+                <a16:creationId xmlns:a16="http://schemas.microsoft.com/office/drawing/2014/main" id="{F4184509-1568-654E-968A-D1DBE14A8214}"/>
+              </a:ext>
+            </a:extLst>
+          </p:cNvPr>
+          <p:cNvSpPr>
+            <a:spLocks noGrp="1"/>
+          </p:cNvSpPr>
+          <p:nvPr>
+            <p:ph idx="1"/>
+          </p:nvPr>
+        </p:nvSpPr>
+        <p:spPr/>
+        <p:txBody>
+          <a:bodyPr/>
+          <a:lstStyle/>
+          <a:p>
+            <a:r>
+              <a:rPr lang="en-US" dirty="0"/>
+              <a:t>Anonymous data- PCA</a:t>
+            </a:r>
+          </a:p>
+          <a:p>
+            <a:endParaRPr lang="en-US" dirty="0"/>
+          </a:p>
+          <a:p>
+            <a:pPr marL="0" indent="0">
+              <a:buNone/>
+            </a:pPr>
+            <a:r>
+              <a:rPr lang="en-US" dirty="0"/>
+              <a:t>&lt;Paste  data received from Bill&gt;</a:t>
+            </a:r>
+          </a:p>
+          <a:p>
+            <a:pPr marL="0" indent="0">
+              <a:buNone/>
+            </a:pPr>
+            <a:endParaRPr lang="en-US" dirty="0"/>
+          </a:p>
+          <a:p>
+            <a:pPr marL="0" indent="0">
+              <a:buNone/>
+            </a:pPr>
+            <a:r>
+              <a:rPr lang="en-US" dirty="0"/>
+              <a:t>New Models</a:t>
+            </a:r>
+          </a:p>
+          <a:p>
+            <a:endParaRPr lang="en-US" dirty="0"/>
+          </a:p>
+          <a:p>
+            <a:endParaRPr lang="en-US" dirty="0"/>
+          </a:p>
+        </p:txBody>
+      </p:sp>
+    </p:spTree>
+    <p:extLst>
+      <p:ext uri="{BB962C8B-B14F-4D97-AF65-F5344CB8AC3E}">
+        <p14:creationId xmlns:p14="http://schemas.microsoft.com/office/powerpoint/2010/main" val="1562986955"/>
+      </p:ext>
+    </p:extLst>
+  </p:cSld>
+  <p:clrMapOvr>
+    <a:masterClrMapping/>
+  </p:clrMapOvr>
+</p:sld>
+</file>
+
+<file path=ppt/slides/slide18.xml><?xml version="1.0" encoding="utf-8"?>
+<p:sld xmlns:a="http://schemas.openxmlformats.org/drawingml/2006/main" xmlns:r="http://schemas.openxmlformats.org/officeDocument/2006/relationships" xmlns:p="http://schemas.openxmlformats.org/presentationml/2006/main">
+  <p:cSld>
+    <p:spTree>
+      <p:nvGrpSpPr>
+        <p:cNvPr id="1" name=""/>
+        <p:cNvGrpSpPr/>
+        <p:nvPr/>
+      </p:nvGrpSpPr>
+      <p:grpSpPr>
+        <a:xfrm>
+          <a:off x="0" y="0"/>
+          <a:ext cx="0" cy="0"/>
+          <a:chOff x="0" y="0"/>
+          <a:chExt cx="0" cy="0"/>
+        </a:xfrm>
+      </p:grpSpPr>
+      <p:sp>
+        <p:nvSpPr>
+          <p:cNvPr id="2" name="Title 1">
+            <a:extLst>
+              <a:ext uri="{FF2B5EF4-FFF2-40B4-BE49-F238E27FC236}">
                 <a16:creationId xmlns:a16="http://schemas.microsoft.com/office/drawing/2014/main" id="{F46194D3-9801-CE4F-A699-B825214D9905}"/>
               </a:ext>
             </a:extLst>
@@ -5891,7 +6685,7 @@
 </p:sld>
 </file>
 
-<file path=ppt/slides/slide11.xml><?xml version="1.0" encoding="utf-8"?>
+<file path=ppt/slides/slide19.xml><?xml version="1.0" encoding="utf-8"?>
 <p:sld xmlns:a="http://schemas.openxmlformats.org/drawingml/2006/main" xmlns:r="http://schemas.openxmlformats.org/officeDocument/2006/relationships" xmlns:p="http://schemas.openxmlformats.org/presentationml/2006/main">
   <p:cSld>
     <p:spTree>
@@ -5972,74 +6766,6 @@
 </p:sld>
 </file>
 
-<file path=ppt/slides/slide12.xml><?xml version="1.0" encoding="utf-8"?>
-<p:sld xmlns:a="http://schemas.openxmlformats.org/drawingml/2006/main" xmlns:r="http://schemas.openxmlformats.org/officeDocument/2006/relationships" xmlns:p="http://schemas.openxmlformats.org/presentationml/2006/main">
-  <p:cSld>
-    <p:spTree>
-      <p:nvGrpSpPr>
-        <p:cNvPr id="1" name=""/>
-        <p:cNvGrpSpPr/>
-        <p:nvPr/>
-      </p:nvGrpSpPr>
-      <p:grpSpPr>
-        <a:xfrm>
-          <a:off x="0" y="0"/>
-          <a:ext cx="0" cy="0"/>
-          <a:chOff x="0" y="0"/>
-          <a:chExt cx="0" cy="0"/>
-        </a:xfrm>
-      </p:grpSpPr>
-      <p:sp>
-        <p:nvSpPr>
-          <p:cNvPr id="2" name="Title 1"/>
-          <p:cNvSpPr>
-            <a:spLocks noGrp="1"/>
-          </p:cNvSpPr>
-          <p:nvPr>
-            <p:ph type="title"/>
-          </p:nvPr>
-        </p:nvSpPr>
-        <p:spPr/>
-        <p:txBody>
-          <a:bodyPr/>
-          <a:lstStyle/>
-          <a:p>
-            <a:endParaRPr lang="en-US" dirty="0"/>
-          </a:p>
-        </p:txBody>
-      </p:sp>
-      <p:sp>
-        <p:nvSpPr>
-          <p:cNvPr id="3" name="Content Placeholder 2"/>
-          <p:cNvSpPr>
-            <a:spLocks noGrp="1"/>
-          </p:cNvSpPr>
-          <p:nvPr>
-            <p:ph idx="1"/>
-          </p:nvPr>
-        </p:nvSpPr>
-        <p:spPr/>
-        <p:txBody>
-          <a:bodyPr/>
-          <a:lstStyle/>
-          <a:p>
-            <a:endParaRPr lang="en-US"/>
-          </a:p>
-        </p:txBody>
-      </p:sp>
-    </p:spTree>
-    <p:extLst>
-      <p:ext uri="{BB962C8B-B14F-4D97-AF65-F5344CB8AC3E}">
-        <p14:creationId xmlns:p14="http://schemas.microsoft.com/office/powerpoint/2010/main" val="3332505446"/>
-      </p:ext>
-    </p:extLst>
-  </p:cSld>
-  <p:clrMapOvr>
-    <a:masterClrMapping/>
-  </p:clrMapOvr>
-</p:sld>
-</file>
-
 <file path=ppt/slides/slide2.xml><?xml version="1.0" encoding="utf-8"?>
 <p:sld xmlns:a="http://schemas.openxmlformats.org/drawingml/2006/main" xmlns:r="http://schemas.openxmlformats.org/officeDocument/2006/relationships" xmlns:p="http://schemas.openxmlformats.org/presentationml/2006/main">
   <p:cSld>
@@ -6133,6 +6859,74 @@
     <p:extLst>
       <p:ext uri="{BB962C8B-B14F-4D97-AF65-F5344CB8AC3E}">
         <p14:creationId xmlns:p14="http://schemas.microsoft.com/office/powerpoint/2010/main" val="1582061626"/>
+      </p:ext>
+    </p:extLst>
+  </p:cSld>
+  <p:clrMapOvr>
+    <a:masterClrMapping/>
+  </p:clrMapOvr>
+</p:sld>
+</file>
+
+<file path=ppt/slides/slide20.xml><?xml version="1.0" encoding="utf-8"?>
+<p:sld xmlns:a="http://schemas.openxmlformats.org/drawingml/2006/main" xmlns:r="http://schemas.openxmlformats.org/officeDocument/2006/relationships" xmlns:p="http://schemas.openxmlformats.org/presentationml/2006/main">
+  <p:cSld>
+    <p:spTree>
+      <p:nvGrpSpPr>
+        <p:cNvPr id="1" name=""/>
+        <p:cNvGrpSpPr/>
+        <p:nvPr/>
+      </p:nvGrpSpPr>
+      <p:grpSpPr>
+        <a:xfrm>
+          <a:off x="0" y="0"/>
+          <a:ext cx="0" cy="0"/>
+          <a:chOff x="0" y="0"/>
+          <a:chExt cx="0" cy="0"/>
+        </a:xfrm>
+      </p:grpSpPr>
+      <p:sp>
+        <p:nvSpPr>
+          <p:cNvPr id="2" name="Title 1"/>
+          <p:cNvSpPr>
+            <a:spLocks noGrp="1"/>
+          </p:cNvSpPr>
+          <p:nvPr>
+            <p:ph type="title"/>
+          </p:nvPr>
+        </p:nvSpPr>
+        <p:spPr/>
+        <p:txBody>
+          <a:bodyPr/>
+          <a:lstStyle/>
+          <a:p>
+            <a:endParaRPr lang="en-US" dirty="0"/>
+          </a:p>
+        </p:txBody>
+      </p:sp>
+      <p:sp>
+        <p:nvSpPr>
+          <p:cNvPr id="3" name="Content Placeholder 2"/>
+          <p:cNvSpPr>
+            <a:spLocks noGrp="1"/>
+          </p:cNvSpPr>
+          <p:nvPr>
+            <p:ph idx="1"/>
+          </p:nvPr>
+        </p:nvSpPr>
+        <p:spPr/>
+        <p:txBody>
+          <a:bodyPr/>
+          <a:lstStyle/>
+          <a:p>
+            <a:endParaRPr lang="en-US"/>
+          </a:p>
+        </p:txBody>
+      </p:sp>
+    </p:spTree>
+    <p:extLst>
+      <p:ext uri="{BB962C8B-B14F-4D97-AF65-F5344CB8AC3E}">
+        <p14:creationId xmlns:p14="http://schemas.microsoft.com/office/powerpoint/2010/main" val="3332505446"/>
       </p:ext>
     </p:extLst>
   </p:cSld>
@@ -6609,106 +7403,49 @@
           </a:p>
         </p:txBody>
       </p:sp>
-      <p:sp>
-        <p:nvSpPr>
-          <p:cNvPr id="3" name="Content Placeholder 2"/>
-          <p:cNvSpPr>
-            <a:spLocks noGrp="1"/>
-          </p:cNvSpPr>
-          <p:nvPr>
-            <p:ph idx="1"/>
-          </p:nvPr>
-        </p:nvSpPr>
-        <p:spPr/>
-        <p:txBody>
-          <a:bodyPr/>
-          <a:lstStyle/>
-          <a:p>
-            <a:pPr marL="0" indent="0">
-              <a:buNone/>
-            </a:pPr>
-            <a:r>
-              <a:rPr lang="en-US" dirty="0"/>
-              <a:t>Massaged the data –  Created a function to generate anomalies</a:t>
-            </a:r>
-          </a:p>
-          <a:p>
-            <a:pPr marL="0" indent="0">
-              <a:buNone/>
-            </a:pPr>
-            <a:r>
-              <a:rPr lang="en-US" dirty="0"/>
-              <a:t>Dimensions , labels </a:t>
-            </a:r>
-            <a:r>
-              <a:rPr lang="en-US" dirty="0" err="1"/>
-              <a:t>etc</a:t>
-            </a:r>
-            <a:r>
-              <a:rPr lang="en-US" dirty="0"/>
-              <a:t> in the data set.</a:t>
-            </a:r>
-          </a:p>
-          <a:p>
-            <a:pPr marL="0" indent="0">
-              <a:buNone/>
-            </a:pPr>
-            <a:endParaRPr lang="en-US" dirty="0"/>
-          </a:p>
-          <a:p>
-            <a:pPr marL="0" indent="0">
-              <a:buNone/>
-            </a:pPr>
-            <a:r>
-              <a:rPr lang="en-US" dirty="0"/>
-              <a:t>&lt;Paste  data received from Nish&gt;</a:t>
-            </a:r>
-          </a:p>
-          <a:p>
-            <a:pPr marL="0" indent="0">
-              <a:buNone/>
-            </a:pPr>
-            <a:endParaRPr lang="en-US" dirty="0"/>
-          </a:p>
-          <a:p>
-            <a:pPr marL="0" indent="0">
-              <a:buNone/>
-            </a:pPr>
-            <a:r>
-              <a:rPr lang="en-US" dirty="0"/>
-              <a:t>New Models</a:t>
-            </a:r>
-          </a:p>
-          <a:p>
-            <a:pPr marL="0" indent="0">
-              <a:buNone/>
-            </a:pPr>
-            <a:endParaRPr lang="en-US" dirty="0"/>
-          </a:p>
-          <a:p>
-            <a:pPr marL="0" indent="0">
-              <a:buNone/>
-            </a:pPr>
-            <a:endParaRPr lang="en-US" dirty="0"/>
-          </a:p>
-          <a:p>
-            <a:pPr marL="0" indent="0">
-              <a:buNone/>
-            </a:pPr>
-            <a:endParaRPr lang="en-US" dirty="0"/>
-          </a:p>
-          <a:p>
-            <a:pPr marL="0" indent="0">
-              <a:buNone/>
-            </a:pPr>
-            <a:endParaRPr lang="en-US" dirty="0"/>
-          </a:p>
-        </p:txBody>
-      </p:sp>
+      <p:pic>
+        <p:nvPicPr>
+          <p:cNvPr id="5" name="Picture 4">
+            <a:extLst>
+              <a:ext uri="{FF2B5EF4-FFF2-40B4-BE49-F238E27FC236}">
+                <a16:creationId xmlns:a16="http://schemas.microsoft.com/office/drawing/2014/main" id="{F243415B-8325-41AD-9964-B3BFAA97BEA6}"/>
+              </a:ext>
+            </a:extLst>
+          </p:cNvPr>
+          <p:cNvPicPr/>
+          <p:nvPr/>
+        </p:nvPicPr>
+        <p:blipFill>
+          <a:blip r:embed="rId2">
+            <a:extLst>
+              <a:ext uri="{28A0092B-C50C-407E-A947-70E740481C1C}">
+                <a14:useLocalDpi xmlns:a14="http://schemas.microsoft.com/office/drawing/2010/main" val="0"/>
+              </a:ext>
+            </a:extLst>
+          </a:blip>
+          <a:srcRect/>
+          <a:stretch>
+            <a:fillRect/>
+          </a:stretch>
+        </p:blipFill>
+        <p:spPr bwMode="auto">
+          <a:xfrm>
+            <a:off x="1683490" y="1835784"/>
+            <a:ext cx="7392777" cy="4361815"/>
+          </a:xfrm>
+          <a:prstGeom prst="rect">
+            <a:avLst/>
+          </a:prstGeom>
+          <a:noFill/>
+          <a:ln>
+            <a:noFill/>
+          </a:ln>
+        </p:spPr>
+      </p:pic>
     </p:spTree>
     <p:extLst>
       <p:ext uri="{BB962C8B-B14F-4D97-AF65-F5344CB8AC3E}">
-        <p14:creationId xmlns:p14="http://schemas.microsoft.com/office/powerpoint/2010/main" val="1237726168"/>
+        <p14:creationId xmlns:p14="http://schemas.microsoft.com/office/powerpoint/2010/main" val="2206545365"/>
       </p:ext>
     </p:extLst>
   </p:cSld>
@@ -6737,7 +7474,13 @@
       </p:grpSpPr>
       <p:sp>
         <p:nvSpPr>
-          <p:cNvPr id="2" name="Title 1"/>
+          <p:cNvPr id="2" name="Title 1">
+            <a:extLst>
+              <a:ext uri="{FF2B5EF4-FFF2-40B4-BE49-F238E27FC236}">
+                <a16:creationId xmlns:a16="http://schemas.microsoft.com/office/drawing/2014/main" id="{E35CAAF8-77CA-4B4E-8223-B0337F6E98C9}"/>
+              </a:ext>
+            </a:extLst>
+          </p:cNvPr>
           <p:cNvSpPr>
             <a:spLocks noGrp="1"/>
           </p:cNvSpPr>
@@ -6750,113 +7493,53 @@
           <a:bodyPr/>
           <a:lstStyle/>
           <a:p>
-            <a:r>
-              <a:rPr lang="en-US" dirty="0"/>
-              <a:t>Unsupervised Learning</a:t>
-            </a:r>
-          </a:p>
-        </p:txBody>
-      </p:sp>
-      <p:sp>
-        <p:nvSpPr>
-          <p:cNvPr id="3" name="Content Placeholder 2"/>
-          <p:cNvSpPr>
-            <a:spLocks noGrp="1"/>
-          </p:cNvSpPr>
-          <p:nvPr>
-            <p:ph idx="1"/>
-          </p:nvPr>
-        </p:nvSpPr>
-        <p:spPr/>
-        <p:txBody>
-          <a:bodyPr/>
-          <a:lstStyle/>
-          <a:p>
-            <a:pPr marL="0" indent="0">
-              <a:buNone/>
-            </a:pPr>
-            <a:r>
-              <a:rPr lang="en-US" dirty="0"/>
-              <a:t>Massaged the data –  Created a function to generate anomalies</a:t>
-            </a:r>
-          </a:p>
-          <a:p>
-            <a:pPr marL="0" indent="0">
-              <a:buNone/>
-            </a:pPr>
-            <a:r>
-              <a:rPr lang="en-US" dirty="0"/>
-              <a:t>Dimensions , labels </a:t>
-            </a:r>
-            <a:r>
-              <a:rPr lang="en-US" dirty="0" err="1"/>
-              <a:t>etc</a:t>
-            </a:r>
-            <a:r>
-              <a:rPr lang="en-US" dirty="0"/>
-              <a:t> in the data set.</a:t>
-            </a:r>
-          </a:p>
-          <a:p>
-            <a:pPr marL="0" indent="0">
-              <a:buNone/>
-            </a:pPr>
-            <a:endParaRPr lang="en-US" dirty="0"/>
-          </a:p>
-          <a:p>
-            <a:pPr marL="0" indent="0">
-              <a:buNone/>
-            </a:pPr>
-            <a:r>
-              <a:rPr lang="en-US" dirty="0"/>
-              <a:t>&lt;Paste  data received from Nish&gt;</a:t>
-            </a:r>
-          </a:p>
-          <a:p>
-            <a:pPr marL="0" indent="0">
-              <a:buNone/>
-            </a:pPr>
-            <a:endParaRPr lang="en-US" dirty="0"/>
-          </a:p>
-          <a:p>
-            <a:pPr marL="0" indent="0">
-              <a:buNone/>
-            </a:pPr>
-            <a:r>
-              <a:rPr lang="en-US" dirty="0"/>
-              <a:t>New Models</a:t>
-            </a:r>
-          </a:p>
-          <a:p>
-            <a:pPr marL="0" indent="0">
-              <a:buNone/>
-            </a:pPr>
-            <a:endParaRPr lang="en-US" dirty="0"/>
-          </a:p>
-          <a:p>
-            <a:pPr marL="0" indent="0">
-              <a:buNone/>
-            </a:pPr>
-            <a:endParaRPr lang="en-US" dirty="0"/>
-          </a:p>
-          <a:p>
-            <a:pPr marL="0" indent="0">
-              <a:buNone/>
-            </a:pPr>
-            <a:endParaRPr lang="en-US" dirty="0"/>
-          </a:p>
-          <a:p>
-            <a:pPr marL="0" indent="0">
-              <a:buNone/>
-            </a:pPr>
-            <a:endParaRPr lang="en-US" dirty="0"/>
-          </a:p>
-        </p:txBody>
-      </p:sp>
+            <a:endParaRPr lang="en-US"/>
+          </a:p>
+        </p:txBody>
+      </p:sp>
+      <p:pic>
+        <p:nvPicPr>
+          <p:cNvPr id="4" name="Picture 3">
+            <a:extLst>
+              <a:ext uri="{FF2B5EF4-FFF2-40B4-BE49-F238E27FC236}">
+                <a16:creationId xmlns:a16="http://schemas.microsoft.com/office/drawing/2014/main" id="{A684614B-32EB-4F4B-A9A5-726312E9BCB9}"/>
+              </a:ext>
+            </a:extLst>
+          </p:cNvPr>
+          <p:cNvPicPr/>
+          <p:nvPr/>
+        </p:nvPicPr>
+        <p:blipFill>
+          <a:blip r:embed="rId2">
+            <a:extLst>
+              <a:ext uri="{28A0092B-C50C-407E-A947-70E740481C1C}">
+                <a14:useLocalDpi xmlns:a14="http://schemas.microsoft.com/office/drawing/2010/main" val="0"/>
+              </a:ext>
+            </a:extLst>
+          </a:blip>
+          <a:srcRect/>
+          <a:stretch>
+            <a:fillRect/>
+          </a:stretch>
+        </p:blipFill>
+        <p:spPr bwMode="auto">
+          <a:xfrm>
+            <a:off x="2658534" y="2107565"/>
+            <a:ext cx="6096000" cy="4065270"/>
+          </a:xfrm>
+          <a:prstGeom prst="rect">
+            <a:avLst/>
+          </a:prstGeom>
+          <a:noFill/>
+          <a:ln>
+            <a:noFill/>
+          </a:ln>
+        </p:spPr>
+      </p:pic>
     </p:spTree>
     <p:extLst>
       <p:ext uri="{BB962C8B-B14F-4D97-AF65-F5344CB8AC3E}">
-        <p14:creationId xmlns:p14="http://schemas.microsoft.com/office/powerpoint/2010/main" val="2206545365"/>
+        <p14:creationId xmlns:p14="http://schemas.microsoft.com/office/powerpoint/2010/main" val="700692621"/>
       </p:ext>
     </p:extLst>
   </p:cSld>
@@ -6888,7 +7571,7 @@
           <p:cNvPr id="2" name="Title 1">
             <a:extLst>
               <a:ext uri="{FF2B5EF4-FFF2-40B4-BE49-F238E27FC236}">
-                <a16:creationId xmlns:a16="http://schemas.microsoft.com/office/drawing/2014/main" id="{E25054A5-8599-D849-A841-108A1CF2FC62}"/>
+                <a16:creationId xmlns:a16="http://schemas.microsoft.com/office/drawing/2014/main" id="{C7CE3EFE-AFF9-44B6-8592-3E117CA67E24}"/>
               </a:ext>
             </a:extLst>
           </p:cNvPr>
@@ -6904,78 +7587,53 @@
           <a:bodyPr/>
           <a:lstStyle/>
           <a:p>
-            <a:r>
-              <a:rPr lang="en-US" dirty="0"/>
-              <a:t>Supervised Learning</a:t>
-            </a:r>
-          </a:p>
-        </p:txBody>
-      </p:sp>
-      <p:sp>
-        <p:nvSpPr>
-          <p:cNvPr id="3" name="Content Placeholder 2">
+            <a:endParaRPr lang="en-US"/>
+          </a:p>
+        </p:txBody>
+      </p:sp>
+      <p:pic>
+        <p:nvPicPr>
+          <p:cNvPr id="4" name="Picture 3">
             <a:extLst>
               <a:ext uri="{FF2B5EF4-FFF2-40B4-BE49-F238E27FC236}">
-                <a16:creationId xmlns:a16="http://schemas.microsoft.com/office/drawing/2014/main" id="{F4184509-1568-654E-968A-D1DBE14A8214}"/>
+                <a16:creationId xmlns:a16="http://schemas.microsoft.com/office/drawing/2014/main" id="{66827872-9961-470C-A639-4E2C5D86E8D7}"/>
               </a:ext>
             </a:extLst>
           </p:cNvPr>
-          <p:cNvSpPr>
-            <a:spLocks noGrp="1"/>
-          </p:cNvSpPr>
-          <p:nvPr>
-            <p:ph idx="1"/>
-          </p:nvPr>
-        </p:nvSpPr>
-        <p:spPr/>
-        <p:txBody>
-          <a:bodyPr/>
-          <a:lstStyle/>
-          <a:p>
-            <a:r>
-              <a:rPr lang="en-US" dirty="0"/>
-              <a:t>Anonymous data- PCA</a:t>
-            </a:r>
-          </a:p>
-          <a:p>
-            <a:endParaRPr lang="en-US" dirty="0"/>
-          </a:p>
-          <a:p>
-            <a:pPr marL="0" indent="0">
-              <a:buNone/>
-            </a:pPr>
-            <a:r>
-              <a:rPr lang="en-US" dirty="0"/>
-              <a:t>&lt;Paste  data received from Bill&gt;</a:t>
-            </a:r>
-          </a:p>
-          <a:p>
-            <a:pPr marL="0" indent="0">
-              <a:buNone/>
-            </a:pPr>
-            <a:endParaRPr lang="en-US" dirty="0"/>
-          </a:p>
-          <a:p>
-            <a:pPr marL="0" indent="0">
-              <a:buNone/>
-            </a:pPr>
-            <a:r>
-              <a:rPr lang="en-US" dirty="0"/>
-              <a:t>New Models</a:t>
-            </a:r>
-          </a:p>
-          <a:p>
-            <a:endParaRPr lang="en-US" dirty="0"/>
-          </a:p>
-          <a:p>
-            <a:endParaRPr lang="en-US" dirty="0"/>
-          </a:p>
-        </p:txBody>
-      </p:sp>
+          <p:cNvPicPr/>
+          <p:nvPr/>
+        </p:nvPicPr>
+        <p:blipFill>
+          <a:blip r:embed="rId2">
+            <a:extLst>
+              <a:ext uri="{28A0092B-C50C-407E-A947-70E740481C1C}">
+                <a14:useLocalDpi xmlns:a14="http://schemas.microsoft.com/office/drawing/2010/main" val="0"/>
+              </a:ext>
+            </a:extLst>
+          </a:blip>
+          <a:srcRect/>
+          <a:stretch>
+            <a:fillRect/>
+          </a:stretch>
+        </p:blipFill>
+        <p:spPr bwMode="auto">
+          <a:xfrm>
+            <a:off x="2728806" y="2032000"/>
+            <a:ext cx="6262794" cy="4199466"/>
+          </a:xfrm>
+          <a:prstGeom prst="rect">
+            <a:avLst/>
+          </a:prstGeom>
+          <a:noFill/>
+          <a:ln>
+            <a:noFill/>
+          </a:ln>
+        </p:spPr>
+      </p:pic>
     </p:spTree>
     <p:extLst>
       <p:ext uri="{BB962C8B-B14F-4D97-AF65-F5344CB8AC3E}">
-        <p14:creationId xmlns:p14="http://schemas.microsoft.com/office/powerpoint/2010/main" val="1562986955"/>
+        <p14:creationId xmlns:p14="http://schemas.microsoft.com/office/powerpoint/2010/main" val="3044553332"/>
       </p:ext>
     </p:extLst>
   </p:cSld>

</xml_diff>